<commit_message>
Metrics and qos separate figures
</commit_message>
<xml_diff>
--- a/documents/Managing System/MetricsAndQoS/MetricsAndQoS.pptx
+++ b/documents/Managing System/MetricsAndQoS/MetricsAndQoS.pptx
@@ -3046,7 +3046,7 @@
           <a:p>
             <a:fld id="{D758E45E-C8C5-BA4F-AA2C-0C40076B5C28}" type="datetimeFigureOut">
               <a:rPr lang="en-GB" smtClean="0"/>
-              <a:t>07/11/2022</a:t>
+              <a:t>28/11/2022</a:t>
             </a:fld>
             <a:endParaRPr lang="en-GB"/>
           </a:p>
@@ -3547,7 +3547,7 @@
           <a:p>
             <a:fld id="{62C199F6-8AFD-9248-B232-FB99D0FCDA97}" type="datetimeFigureOut">
               <a:rPr lang="en-GB" smtClean="0"/>
-              <a:t>07/11/2022</a:t>
+              <a:t>28/11/2022</a:t>
             </a:fld>
             <a:endParaRPr lang="en-GB" dirty="0"/>
           </a:p>
@@ -3747,7 +3747,7 @@
           <a:p>
             <a:fld id="{62C199F6-8AFD-9248-B232-FB99D0FCDA97}" type="datetimeFigureOut">
               <a:rPr lang="en-GB" smtClean="0"/>
-              <a:t>07/11/2022</a:t>
+              <a:t>28/11/2022</a:t>
             </a:fld>
             <a:endParaRPr lang="en-GB" dirty="0"/>
           </a:p>
@@ -3957,7 +3957,7 @@
           <a:p>
             <a:fld id="{62C199F6-8AFD-9248-B232-FB99D0FCDA97}" type="datetimeFigureOut">
               <a:rPr lang="en-GB" smtClean="0"/>
-              <a:t>07/11/2022</a:t>
+              <a:t>28/11/2022</a:t>
             </a:fld>
             <a:endParaRPr lang="en-GB" dirty="0"/>
           </a:p>
@@ -4157,7 +4157,7 @@
           <a:p>
             <a:fld id="{62C199F6-8AFD-9248-B232-FB99D0FCDA97}" type="datetimeFigureOut">
               <a:rPr lang="en-GB" smtClean="0"/>
-              <a:t>07/11/2022</a:t>
+              <a:t>28/11/2022</a:t>
             </a:fld>
             <a:endParaRPr lang="en-GB" dirty="0"/>
           </a:p>
@@ -4433,7 +4433,7 @@
           <a:p>
             <a:fld id="{62C199F6-8AFD-9248-B232-FB99D0FCDA97}" type="datetimeFigureOut">
               <a:rPr lang="en-GB" smtClean="0"/>
-              <a:t>07/11/2022</a:t>
+              <a:t>28/11/2022</a:t>
             </a:fld>
             <a:endParaRPr lang="en-GB" dirty="0"/>
           </a:p>
@@ -4701,7 +4701,7 @@
           <a:p>
             <a:fld id="{62C199F6-8AFD-9248-B232-FB99D0FCDA97}" type="datetimeFigureOut">
               <a:rPr lang="en-GB" smtClean="0"/>
-              <a:t>07/11/2022</a:t>
+              <a:t>28/11/2022</a:t>
             </a:fld>
             <a:endParaRPr lang="en-GB" dirty="0"/>
           </a:p>
@@ -5116,7 +5116,7 @@
           <a:p>
             <a:fld id="{62C199F6-8AFD-9248-B232-FB99D0FCDA97}" type="datetimeFigureOut">
               <a:rPr lang="en-GB" smtClean="0"/>
-              <a:t>07/11/2022</a:t>
+              <a:t>28/11/2022</a:t>
             </a:fld>
             <a:endParaRPr lang="en-GB" dirty="0"/>
           </a:p>
@@ -5258,7 +5258,7 @@
           <a:p>
             <a:fld id="{62C199F6-8AFD-9248-B232-FB99D0FCDA97}" type="datetimeFigureOut">
               <a:rPr lang="en-GB" smtClean="0"/>
-              <a:t>07/11/2022</a:t>
+              <a:t>28/11/2022</a:t>
             </a:fld>
             <a:endParaRPr lang="en-GB" dirty="0"/>
           </a:p>
@@ -5371,7 +5371,7 @@
           <a:p>
             <a:fld id="{62C199F6-8AFD-9248-B232-FB99D0FCDA97}" type="datetimeFigureOut">
               <a:rPr lang="en-GB" smtClean="0"/>
-              <a:t>07/11/2022</a:t>
+              <a:t>28/11/2022</a:t>
             </a:fld>
             <a:endParaRPr lang="en-GB" dirty="0"/>
           </a:p>
@@ -5684,7 +5684,7 @@
           <a:p>
             <a:fld id="{62C199F6-8AFD-9248-B232-FB99D0FCDA97}" type="datetimeFigureOut">
               <a:rPr lang="en-GB" smtClean="0"/>
-              <a:t>07/11/2022</a:t>
+              <a:t>28/11/2022</a:t>
             </a:fld>
             <a:endParaRPr lang="en-GB" dirty="0"/>
           </a:p>
@@ -5973,7 +5973,7 @@
           <a:p>
             <a:fld id="{62C199F6-8AFD-9248-B232-FB99D0FCDA97}" type="datetimeFigureOut">
               <a:rPr lang="en-GB" smtClean="0"/>
-              <a:t>07/11/2022</a:t>
+              <a:t>28/11/2022</a:t>
             </a:fld>
             <a:endParaRPr lang="en-GB" dirty="0"/>
           </a:p>
@@ -6216,7 +6216,7 @@
           <a:p>
             <a:fld id="{62C199F6-8AFD-9248-B232-FB99D0FCDA97}" type="datetimeFigureOut">
               <a:rPr lang="en-GB" smtClean="0"/>
-              <a:t>07/11/2022</a:t>
+              <a:t>28/11/2022</a:t>
             </a:fld>
             <a:endParaRPr lang="en-GB" dirty="0"/>
           </a:p>
@@ -6646,13 +6646,13 @@
           <p:nvPr>
             <p:extLst>
               <p:ext uri="{D42A27DB-BD31-4B8C-83A1-F6EECF244321}">
-                <p14:modId xmlns:p14="http://schemas.microsoft.com/office/powerpoint/2010/main" val="2356061600"/>
+                <p14:modId xmlns:p14="http://schemas.microsoft.com/office/powerpoint/2010/main" val="480718326"/>
               </p:ext>
             </p:extLst>
           </p:nvPr>
         </p:nvGraphicFramePr>
         <p:xfrm>
-          <a:off x="3277713" y="650688"/>
+          <a:off x="3588435" y="171291"/>
           <a:ext cx="1152634" cy="842534"/>
         </p:xfrm>
         <a:graphic>
@@ -6675,7 +6675,7 @@
         </p:nvSpPr>
         <p:spPr>
           <a:xfrm>
-            <a:off x="3344278" y="1493222"/>
+            <a:off x="3655000" y="1013825"/>
             <a:ext cx="1019503" cy="461665"/>
           </a:xfrm>
           <a:prstGeom prst="rect">
@@ -6716,9 +6716,9 @@
           <p:nvPr/>
         </p:nvCxnSpPr>
         <p:spPr>
-          <a:xfrm>
-            <a:off x="4472097" y="1160749"/>
-            <a:ext cx="3113865" cy="9642"/>
+          <a:xfrm flipV="1">
+            <a:off x="4919328" y="690994"/>
+            <a:ext cx="2666634" cy="2837"/>
           </a:xfrm>
           <a:prstGeom prst="straightConnector1">
             <a:avLst/>
@@ -6756,7 +6756,7 @@
         </p:nvSpPr>
         <p:spPr>
           <a:xfrm>
-            <a:off x="5398533" y="908781"/>
+            <a:off x="5496188" y="429384"/>
             <a:ext cx="1511952" cy="276999"/>
           </a:xfrm>
           <a:prstGeom prst="rect">
@@ -6795,7 +6795,7 @@
         </p:nvSpPr>
         <p:spPr>
           <a:xfrm>
-            <a:off x="8079675" y="702483"/>
+            <a:off x="8079675" y="223086"/>
             <a:ext cx="289932" cy="412595"/>
           </a:xfrm>
           <a:prstGeom prst="rect">
@@ -6853,7 +6853,7 @@
         </p:nvSpPr>
         <p:spPr>
           <a:xfrm>
-            <a:off x="7658517" y="1846608"/>
+            <a:off x="7658517" y="1367211"/>
             <a:ext cx="1543820" cy="461665"/>
           </a:xfrm>
           <a:prstGeom prst="rect">
@@ -6893,7 +6893,7 @@
         </p:nvSpPr>
         <p:spPr>
           <a:xfrm>
-            <a:off x="3464354" y="2607925"/>
+            <a:off x="3464354" y="2128528"/>
             <a:ext cx="289932" cy="412595"/>
           </a:xfrm>
           <a:prstGeom prst="rect">
@@ -6951,7 +6951,7 @@
         </p:nvSpPr>
         <p:spPr>
           <a:xfrm>
-            <a:off x="3974106" y="2607924"/>
+            <a:off x="3974106" y="2128527"/>
             <a:ext cx="289932" cy="412595"/>
           </a:xfrm>
           <a:prstGeom prst="rect">
@@ -7009,7 +7009,7 @@
         </p:nvSpPr>
         <p:spPr>
           <a:xfrm>
-            <a:off x="4445306" y="2766096"/>
+            <a:off x="4445306" y="2286699"/>
             <a:ext cx="377026" cy="369332"/>
           </a:xfrm>
           <a:prstGeom prst="rect">
@@ -7048,7 +7048,7 @@
         </p:nvSpPr>
         <p:spPr>
           <a:xfrm>
-            <a:off x="4953319" y="2607924"/>
+            <a:off x="4953319" y="2128527"/>
             <a:ext cx="289932" cy="412595"/>
           </a:xfrm>
           <a:prstGeom prst="rect">
@@ -7106,7 +7106,7 @@
         </p:nvSpPr>
         <p:spPr>
           <a:xfrm rot="16200000">
-            <a:off x="4322281" y="2105037"/>
+            <a:off x="4322281" y="1625640"/>
             <a:ext cx="61554" cy="2045339"/>
           </a:xfrm>
           <a:prstGeom prst="leftBracket">
@@ -7154,7 +7154,7 @@
         </p:nvSpPr>
         <p:spPr>
           <a:xfrm>
-            <a:off x="3010560" y="3213903"/>
+            <a:off x="3010560" y="2734506"/>
             <a:ext cx="2684996" cy="646331"/>
           </a:xfrm>
           <a:prstGeom prst="rect">
@@ -7274,7 +7274,7 @@
         </p:nvCxnSpPr>
         <p:spPr>
           <a:xfrm>
-            <a:off x="5601196" y="2806761"/>
+            <a:off x="5601196" y="2327364"/>
             <a:ext cx="2468670" cy="0"/>
           </a:xfrm>
           <a:prstGeom prst="straightConnector1">
@@ -7313,7 +7313,7 @@
         </p:nvSpPr>
         <p:spPr>
           <a:xfrm>
-            <a:off x="5674601" y="2545151"/>
+            <a:off x="5674601" y="2065754"/>
             <a:ext cx="2311851" cy="276999"/>
           </a:xfrm>
           <a:prstGeom prst="rect">
@@ -7352,7 +7352,7 @@
         </p:nvSpPr>
         <p:spPr>
           <a:xfrm>
-            <a:off x="8369607" y="2607924"/>
+            <a:off x="8369607" y="2128527"/>
             <a:ext cx="289932" cy="412595"/>
           </a:xfrm>
           <a:prstGeom prst="rect">
@@ -7410,7 +7410,7 @@
         </p:nvSpPr>
         <p:spPr>
           <a:xfrm>
-            <a:off x="3429959" y="2322978"/>
+            <a:off x="3429959" y="1843581"/>
             <a:ext cx="364202" cy="276999"/>
           </a:xfrm>
           <a:prstGeom prst="rect">
@@ -7462,7 +7462,7 @@
         </p:nvSpPr>
         <p:spPr>
           <a:xfrm>
-            <a:off x="7938256" y="3161399"/>
+            <a:off x="7938256" y="2682002"/>
             <a:ext cx="1152633" cy="276999"/>
           </a:xfrm>
           <a:prstGeom prst="rect">
@@ -7502,7 +7502,7 @@
         </p:nvSpPr>
         <p:spPr>
           <a:xfrm>
-            <a:off x="3464354" y="4264929"/>
+            <a:off x="3464354" y="3670118"/>
             <a:ext cx="289932" cy="412595"/>
           </a:xfrm>
           <a:prstGeom prst="rect">
@@ -7565,7 +7565,7 @@
         </p:nvSpPr>
         <p:spPr>
           <a:xfrm>
-            <a:off x="3974106" y="4264929"/>
+            <a:off x="3974106" y="3670118"/>
             <a:ext cx="289932" cy="412595"/>
           </a:xfrm>
           <a:prstGeom prst="rect">
@@ -7628,7 +7628,7 @@
         </p:nvSpPr>
         <p:spPr>
           <a:xfrm>
-            <a:off x="4451819" y="4424844"/>
+            <a:off x="4451819" y="3830033"/>
             <a:ext cx="377026" cy="369332"/>
           </a:xfrm>
           <a:prstGeom prst="rect">
@@ -7667,7 +7667,7 @@
         </p:nvSpPr>
         <p:spPr>
           <a:xfrm>
-            <a:off x="4966117" y="4264929"/>
+            <a:off x="4966117" y="3670118"/>
             <a:ext cx="289932" cy="412595"/>
           </a:xfrm>
           <a:prstGeom prst="rect">
@@ -7730,7 +7730,7 @@
         </p:nvSpPr>
         <p:spPr>
           <a:xfrm>
-            <a:off x="5468589" y="4264929"/>
+            <a:off x="5468589" y="3670118"/>
             <a:ext cx="289932" cy="412595"/>
           </a:xfrm>
           <a:prstGeom prst="rect">
@@ -7793,7 +7793,7 @@
         </p:nvSpPr>
         <p:spPr>
           <a:xfrm>
-            <a:off x="5978341" y="4264929"/>
+            <a:off x="5978341" y="3670118"/>
             <a:ext cx="289932" cy="412595"/>
           </a:xfrm>
           <a:prstGeom prst="rect">
@@ -7856,7 +7856,7 @@
         </p:nvSpPr>
         <p:spPr>
           <a:xfrm>
-            <a:off x="6456054" y="4424844"/>
+            <a:off x="6456054" y="3830033"/>
             <a:ext cx="377026" cy="369332"/>
           </a:xfrm>
           <a:prstGeom prst="rect">
@@ -7895,7 +7895,7 @@
         </p:nvSpPr>
         <p:spPr>
           <a:xfrm>
-            <a:off x="6970352" y="4264929"/>
+            <a:off x="6970352" y="3670118"/>
             <a:ext cx="289932" cy="412595"/>
           </a:xfrm>
           <a:prstGeom prst="rect">
@@ -7960,8 +7960,8 @@
         </p:nvCxnSpPr>
         <p:spPr>
           <a:xfrm flipH="1">
-            <a:off x="7260284" y="3441111"/>
-            <a:ext cx="901748" cy="823818"/>
+            <a:off x="7260284" y="2961714"/>
+            <a:ext cx="901748" cy="709263"/>
           </a:xfrm>
           <a:prstGeom prst="straightConnector1">
             <a:avLst/>
@@ -8002,7 +8002,7 @@
         </p:nvSpPr>
         <p:spPr>
           <a:xfrm>
-            <a:off x="8122719" y="4071404"/>
+            <a:off x="8122719" y="3476593"/>
             <a:ext cx="289932" cy="412595"/>
           </a:xfrm>
           <a:prstGeom prst="rect">
@@ -8065,7 +8065,7 @@
         </p:nvSpPr>
         <p:spPr>
           <a:xfrm>
-            <a:off x="8456408" y="4154376"/>
+            <a:off x="8456408" y="3559565"/>
             <a:ext cx="955711" cy="276999"/>
           </a:xfrm>
           <a:prstGeom prst="rect">
@@ -8104,7 +8104,7 @@
         </p:nvSpPr>
         <p:spPr>
           <a:xfrm>
-            <a:off x="8122719" y="4674378"/>
+            <a:off x="8122719" y="4079567"/>
             <a:ext cx="289932" cy="412595"/>
           </a:xfrm>
           <a:prstGeom prst="rect">
@@ -8167,7 +8167,7 @@
         </p:nvSpPr>
         <p:spPr>
           <a:xfrm>
-            <a:off x="8456408" y="4749870"/>
+            <a:off x="8456408" y="4155059"/>
             <a:ext cx="1063112" cy="276999"/>
           </a:xfrm>
           <a:prstGeom prst="rect">
@@ -8206,7 +8206,7 @@
         </p:nvSpPr>
         <p:spPr>
           <a:xfrm>
-            <a:off x="3150700" y="4695626"/>
+            <a:off x="3150700" y="4100815"/>
             <a:ext cx="917239" cy="276999"/>
           </a:xfrm>
           <a:prstGeom prst="rect">
@@ -8246,7 +8246,7 @@
         </p:nvSpPr>
         <p:spPr>
           <a:xfrm>
-            <a:off x="6608611" y="4695626"/>
+            <a:off x="6608611" y="4100815"/>
             <a:ext cx="1013419" cy="276999"/>
           </a:xfrm>
           <a:prstGeom prst="rect">
@@ -8286,7 +8286,7 @@
         </p:nvSpPr>
         <p:spPr>
           <a:xfrm rot="16200000">
-            <a:off x="5372773" y="2825831"/>
+            <a:off x="5372773" y="2231020"/>
             <a:ext cx="45719" cy="4308529"/>
           </a:xfrm>
           <a:prstGeom prst="leftBracket">
@@ -8334,7 +8334,7 @@
         </p:nvSpPr>
         <p:spPr>
           <a:xfrm>
-            <a:off x="5329557" y="5004810"/>
+            <a:off x="5329557" y="4409999"/>
             <a:ext cx="1016625" cy="276999"/>
           </a:xfrm>
           <a:prstGeom prst="rect">
@@ -8376,7 +8376,7 @@
         </p:nvCxnSpPr>
         <p:spPr>
           <a:xfrm flipH="1">
-            <a:off x="5243251" y="1500715"/>
+            <a:off x="5243251" y="1021318"/>
             <a:ext cx="2981390" cy="1119834"/>
           </a:xfrm>
           <a:prstGeom prst="straightConnector1">
@@ -8412,13 +8412,12 @@
           </p:cNvPr>
           <p:cNvCxnSpPr>
             <a:cxnSpLocks/>
-            <a:endCxn id="82" idx="0"/>
           </p:cNvCxnSpPr>
           <p:nvPr/>
         </p:nvCxnSpPr>
         <p:spPr>
           <a:xfrm>
-            <a:off x="5365842" y="4052812"/>
+            <a:off x="5365842" y="3458001"/>
             <a:ext cx="0" cy="1281279"/>
           </a:xfrm>
           <a:prstGeom prst="line">
@@ -8460,7 +8459,7 @@
         </p:nvSpPr>
         <p:spPr>
           <a:xfrm>
-            <a:off x="4324314" y="5334091"/>
+            <a:off x="4324314" y="4730402"/>
             <a:ext cx="2083055" cy="276999"/>
           </a:xfrm>
           <a:prstGeom prst="rect">
@@ -8500,8 +8499,8 @@
         </p:nvSpPr>
         <p:spPr>
           <a:xfrm>
-            <a:off x="2097074" y="2689152"/>
-            <a:ext cx="974947" cy="276999"/>
+            <a:off x="2097075" y="2209755"/>
+            <a:ext cx="974946" cy="276999"/>
           </a:xfrm>
           <a:prstGeom prst="rect">
             <a:avLst/>
@@ -8541,10 +8540,10 @@
       </p:sp>
       <p:sp>
         <p:nvSpPr>
-          <p:cNvPr id="9" name="CasellaDiTesto 8">
-            <a:extLst>
-              <a:ext uri="{FF2B5EF4-FFF2-40B4-BE49-F238E27FC236}">
-                <a16:creationId xmlns:a16="http://schemas.microsoft.com/office/drawing/2014/main" id="{046DB53E-48F6-5765-5BD1-4A1DE29B65E2}"/>
+          <p:cNvPr id="10" name="CasellaDiTesto 9">
+            <a:extLst>
+              <a:ext uri="{FF2B5EF4-FFF2-40B4-BE49-F238E27FC236}">
+                <a16:creationId xmlns:a16="http://schemas.microsoft.com/office/drawing/2014/main" id="{A2B50703-6CAB-6A91-711F-EE50527D8DCC}"/>
               </a:ext>
             </a:extLst>
           </p:cNvPr>
@@ -8553,61 +8552,8 @@
         </p:nvSpPr>
         <p:spPr>
           <a:xfrm>
-            <a:off x="2097074" y="4340421"/>
-            <a:ext cx="974947" cy="276999"/>
-          </a:xfrm>
-          <a:prstGeom prst="rect">
-            <a:avLst/>
-          </a:prstGeom>
-          <a:noFill/>
-        </p:spPr>
-        <p:txBody>
-          <a:bodyPr wrap="none" rtlCol="0">
-            <a:spAutoFit/>
-          </a:bodyPr>
-          <a:lstStyle/>
-          <a:p>
-            <a:pPr algn="r"/>
-            <a:r>
-              <a:rPr lang="en-GB" sz="1200" noProof="1">
-                <a:latin typeface="CMU Serif Roman" panose="02000603000000000000" pitchFamily="2" charset="0"/>
-                <a:ea typeface="CMU Serif Roman" panose="02000603000000000000" pitchFamily="2" charset="0"/>
-                <a:cs typeface="CMU Serif Roman" panose="02000603000000000000" pitchFamily="2" charset="0"/>
-              </a:rPr>
-              <a:t>∀ instance </a:t>
-            </a:r>
-            <a:r>
-              <a:rPr lang="en-GB" sz="1200" noProof="1">
-                <a:latin typeface="CMU Concrete Roman" panose="02000603000000000000" pitchFamily="2" charset="0"/>
-                <a:ea typeface="CMU Concrete Roman" panose="02000603000000000000" pitchFamily="2" charset="0"/>
-                <a:cs typeface="CMU Concrete Roman" panose="02000603000000000000" pitchFamily="2" charset="0"/>
-              </a:rPr>
-              <a:t>i</a:t>
-            </a:r>
-            <a:endParaRPr lang="en-GB" sz="1200" noProof="1">
-              <a:latin typeface="CMU Serif Roman" panose="02000603000000000000" pitchFamily="2" charset="0"/>
-              <a:ea typeface="CMU Serif Roman" panose="02000603000000000000" pitchFamily="2" charset="0"/>
-              <a:cs typeface="CMU Serif Roman" panose="02000603000000000000" pitchFamily="2" charset="0"/>
-            </a:endParaRPr>
-          </a:p>
-        </p:txBody>
-      </p:sp>
-      <p:sp>
-        <p:nvSpPr>
-          <p:cNvPr id="10" name="CasellaDiTesto 9">
-            <a:extLst>
-              <a:ext uri="{FF2B5EF4-FFF2-40B4-BE49-F238E27FC236}">
-                <a16:creationId xmlns:a16="http://schemas.microsoft.com/office/drawing/2014/main" id="{A2B50703-6CAB-6A91-711F-EE50527D8DCC}"/>
-              </a:ext>
-            </a:extLst>
-          </p:cNvPr>
-          <p:cNvSpPr txBox="1"/>
-          <p:nvPr/>
-        </p:nvSpPr>
-        <p:spPr>
-          <a:xfrm>
-            <a:off x="4472097" y="2322978"/>
-            <a:ext cx="341760" cy="276999"/>
+            <a:off x="3948192" y="1843581"/>
+            <a:ext cx="364202" cy="276999"/>
           </a:xfrm>
           <a:prstGeom prst="rect">
             <a:avLst/>
@@ -8634,7 +8580,7 @@
                 <a:ea typeface="CMU Serif Roman" panose="02000603000000000000" pitchFamily="2" charset="0"/>
                 <a:cs typeface="CMU Serif Roman" panose="02000603000000000000" pitchFamily="2" charset="0"/>
               </a:rPr>
-              <a:t>i</a:t>
+              <a:t>2</a:t>
             </a:r>
             <a:endParaRPr lang="en-GB" sz="1200" baseline="-25000" noProof="1">
               <a:latin typeface="CMU Serif Roman" panose="02000603000000000000" pitchFamily="2" charset="0"/>
@@ -8658,7 +8604,7 @@
         </p:nvSpPr>
         <p:spPr>
           <a:xfrm>
-            <a:off x="4942108" y="2322978"/>
+            <a:off x="4942108" y="1843581"/>
             <a:ext cx="370614" cy="276999"/>
           </a:xfrm>
           <a:prstGeom prst="rect">
@@ -8710,7 +8656,7 @@
         </p:nvSpPr>
         <p:spPr>
           <a:xfrm>
-            <a:off x="7776384" y="505535"/>
+            <a:off x="7776384" y="26138"/>
             <a:ext cx="1308086" cy="1308086"/>
           </a:xfrm>
           <a:prstGeom prst="ellipse">
@@ -8761,7 +8707,7 @@
         </p:nvSpPr>
         <p:spPr>
           <a:xfrm>
-            <a:off x="8625029" y="871020"/>
+            <a:off x="8625029" y="391623"/>
             <a:ext cx="289932" cy="412595"/>
           </a:xfrm>
           <a:prstGeom prst="rect">
@@ -8819,7 +8765,7 @@
         </p:nvSpPr>
         <p:spPr>
           <a:xfrm>
-            <a:off x="8224641" y="1294417"/>
+            <a:off x="8224641" y="815020"/>
             <a:ext cx="289932" cy="412595"/>
           </a:xfrm>
           <a:prstGeom prst="rect">
@@ -8856,6 +8802,602 @@
           <a:p>
             <a:pPr algn="ctr"/>
             <a:endParaRPr lang="en-GB" sz="1200" noProof="1">
+              <a:latin typeface="CMU Serif Roman" panose="02000603000000000000" pitchFamily="2" charset="0"/>
+              <a:ea typeface="CMU Serif Roman" panose="02000603000000000000" pitchFamily="2" charset="0"/>
+              <a:cs typeface="CMU Serif Roman" panose="02000603000000000000" pitchFamily="2" charset="0"/>
+            </a:endParaRPr>
+          </a:p>
+        </p:txBody>
+      </p:sp>
+      <p:sp>
+        <p:nvSpPr>
+          <p:cNvPr id="5" name="CasellaDiTesto 4">
+            <a:extLst>
+              <a:ext uri="{FF2B5EF4-FFF2-40B4-BE49-F238E27FC236}">
+                <a16:creationId xmlns:a16="http://schemas.microsoft.com/office/drawing/2014/main" id="{479CBC4D-2573-731F-B101-F5279FBE0042}"/>
+              </a:ext>
+            </a:extLst>
+          </p:cNvPr>
+          <p:cNvSpPr txBox="1"/>
+          <p:nvPr/>
+        </p:nvSpPr>
+        <p:spPr>
+          <a:xfrm>
+            <a:off x="2097075" y="3750688"/>
+            <a:ext cx="974946" cy="276999"/>
+          </a:xfrm>
+          <a:prstGeom prst="rect">
+            <a:avLst/>
+          </a:prstGeom>
+          <a:noFill/>
+        </p:spPr>
+        <p:txBody>
+          <a:bodyPr wrap="none" rtlCol="0">
+            <a:spAutoFit/>
+          </a:bodyPr>
+          <a:lstStyle/>
+          <a:p>
+            <a:pPr algn="r"/>
+            <a:r>
+              <a:rPr lang="en-GB" sz="1200" noProof="1">
+                <a:latin typeface="CMU Serif Roman" panose="02000603000000000000" pitchFamily="2" charset="0"/>
+                <a:ea typeface="CMU Serif Roman" panose="02000603000000000000" pitchFamily="2" charset="0"/>
+                <a:cs typeface="CMU Serif Roman" panose="02000603000000000000" pitchFamily="2" charset="0"/>
+              </a:rPr>
+              <a:t>∀ instance </a:t>
+            </a:r>
+            <a:r>
+              <a:rPr lang="en-GB" sz="1200" noProof="1">
+                <a:latin typeface="CMU Concrete" panose="02000603000000000000" pitchFamily="2" charset="0"/>
+                <a:ea typeface="CMU Concrete" panose="02000603000000000000" pitchFamily="2" charset="0"/>
+                <a:cs typeface="CMU Concrete" panose="02000603000000000000" pitchFamily="2" charset="0"/>
+              </a:rPr>
+              <a:t>i</a:t>
+            </a:r>
+            <a:endParaRPr lang="en-GB" sz="1200" noProof="1">
+              <a:latin typeface="CMU Serif Roman" panose="02000603000000000000" pitchFamily="2" charset="0"/>
+              <a:ea typeface="CMU Serif Roman" panose="02000603000000000000" pitchFamily="2" charset="0"/>
+              <a:cs typeface="CMU Serif Roman" panose="02000603000000000000" pitchFamily="2" charset="0"/>
+            </a:endParaRPr>
+          </a:p>
+        </p:txBody>
+      </p:sp>
+      <p:sp>
+        <p:nvSpPr>
+          <p:cNvPr id="6" name="Ovale 5">
+            <a:extLst>
+              <a:ext uri="{FF2B5EF4-FFF2-40B4-BE49-F238E27FC236}">
+                <a16:creationId xmlns:a16="http://schemas.microsoft.com/office/drawing/2014/main" id="{878AE42B-6BD8-8FC9-CD85-8B739143E3D1}"/>
+              </a:ext>
+            </a:extLst>
+          </p:cNvPr>
+          <p:cNvSpPr/>
+          <p:nvPr/>
+        </p:nvSpPr>
+        <p:spPr>
+          <a:xfrm>
+            <a:off x="3806760" y="5112779"/>
+            <a:ext cx="1308086" cy="1308086"/>
+          </a:xfrm>
+          <a:prstGeom prst="ellipse">
+            <a:avLst/>
+          </a:prstGeom>
+          <a:solidFill>
+            <a:schemeClr val="bg1"/>
+          </a:solidFill>
+        </p:spPr>
+        <p:style>
+          <a:lnRef idx="2">
+            <a:schemeClr val="accent1">
+              <a:shade val="50000"/>
+            </a:schemeClr>
+          </a:lnRef>
+          <a:fillRef idx="1">
+            <a:schemeClr val="accent1"/>
+          </a:fillRef>
+          <a:effectRef idx="0">
+            <a:schemeClr val="accent1"/>
+          </a:effectRef>
+          <a:fontRef idx="minor">
+            <a:schemeClr val="lt1"/>
+          </a:fontRef>
+        </p:style>
+        <p:txBody>
+          <a:bodyPr rtlCol="0" anchor="ctr"/>
+          <a:lstStyle/>
+          <a:p>
+            <a:pPr algn="ctr"/>
+            <a:endParaRPr lang="en-GB" sz="1200">
+              <a:latin typeface="CMU Serif Roman" panose="02000603000000000000" pitchFamily="2" charset="0"/>
+              <a:ea typeface="CMU Serif Roman" panose="02000603000000000000" pitchFamily="2" charset="0"/>
+              <a:cs typeface="CMU Serif Roman" panose="02000603000000000000" pitchFamily="2" charset="0"/>
+            </a:endParaRPr>
+          </a:p>
+        </p:txBody>
+      </p:sp>
+      <p:sp>
+        <p:nvSpPr>
+          <p:cNvPr id="12" name="Rettangolo 11">
+            <a:extLst>
+              <a:ext uri="{FF2B5EF4-FFF2-40B4-BE49-F238E27FC236}">
+                <a16:creationId xmlns:a16="http://schemas.microsoft.com/office/drawing/2014/main" id="{CC01FC26-9C17-E633-11F2-CE64D12BC54F}"/>
+              </a:ext>
+            </a:extLst>
+          </p:cNvPr>
+          <p:cNvSpPr/>
+          <p:nvPr/>
+        </p:nvSpPr>
+        <p:spPr>
+          <a:xfrm>
+            <a:off x="4037481" y="5342349"/>
+            <a:ext cx="289932" cy="412595"/>
+          </a:xfrm>
+          <a:prstGeom prst="rect">
+            <a:avLst/>
+          </a:prstGeom>
+          <a:pattFill prst="pct40">
+            <a:fgClr>
+              <a:srgbClr val="00B050"/>
+            </a:fgClr>
+            <a:bgClr>
+              <a:schemeClr val="bg1"/>
+            </a:bgClr>
+          </a:pattFill>
+          <a:ln>
+            <a:solidFill>
+              <a:srgbClr val="00B050"/>
+            </a:solidFill>
+          </a:ln>
+        </p:spPr>
+        <p:style>
+          <a:lnRef idx="2">
+            <a:schemeClr val="accent1">
+              <a:shade val="50000"/>
+            </a:schemeClr>
+          </a:lnRef>
+          <a:fillRef idx="1">
+            <a:schemeClr val="accent1"/>
+          </a:fillRef>
+          <a:effectRef idx="0">
+            <a:schemeClr val="accent1"/>
+          </a:effectRef>
+          <a:fontRef idx="minor">
+            <a:schemeClr val="lt1"/>
+          </a:fontRef>
+        </p:style>
+        <p:txBody>
+          <a:bodyPr rtlCol="0" anchor="ctr"/>
+          <a:lstStyle/>
+          <a:p>
+            <a:pPr algn="ctr"/>
+            <a:endParaRPr lang="en-GB" sz="1200" dirty="0">
+              <a:latin typeface="CMU Serif Roman" panose="02000603000000000000" pitchFamily="2" charset="0"/>
+              <a:ea typeface="CMU Serif Roman" panose="02000603000000000000" pitchFamily="2" charset="0"/>
+              <a:cs typeface="CMU Serif Roman" panose="02000603000000000000" pitchFamily="2" charset="0"/>
+            </a:endParaRPr>
+          </a:p>
+        </p:txBody>
+      </p:sp>
+      <p:sp>
+        <p:nvSpPr>
+          <p:cNvPr id="13" name="Rettangolo 12">
+            <a:extLst>
+              <a:ext uri="{FF2B5EF4-FFF2-40B4-BE49-F238E27FC236}">
+                <a16:creationId xmlns:a16="http://schemas.microsoft.com/office/drawing/2014/main" id="{08FB02D4-7D39-0D63-6839-3A00121B563B}"/>
+              </a:ext>
+            </a:extLst>
+          </p:cNvPr>
+          <p:cNvSpPr/>
+          <p:nvPr/>
+        </p:nvSpPr>
+        <p:spPr>
+          <a:xfrm>
+            <a:off x="4629396" y="5409300"/>
+            <a:ext cx="289932" cy="412595"/>
+          </a:xfrm>
+          <a:prstGeom prst="rect">
+            <a:avLst/>
+          </a:prstGeom>
+          <a:pattFill prst="pct40">
+            <a:fgClr>
+              <a:srgbClr val="00B050"/>
+            </a:fgClr>
+            <a:bgClr>
+              <a:schemeClr val="bg1"/>
+            </a:bgClr>
+          </a:pattFill>
+          <a:ln>
+            <a:solidFill>
+              <a:srgbClr val="00B050"/>
+            </a:solidFill>
+          </a:ln>
+        </p:spPr>
+        <p:style>
+          <a:lnRef idx="2">
+            <a:schemeClr val="accent1">
+              <a:shade val="50000"/>
+            </a:schemeClr>
+          </a:lnRef>
+          <a:fillRef idx="1">
+            <a:schemeClr val="accent1"/>
+          </a:fillRef>
+          <a:effectRef idx="0">
+            <a:schemeClr val="accent1"/>
+          </a:effectRef>
+          <a:fontRef idx="minor">
+            <a:schemeClr val="lt1"/>
+          </a:fontRef>
+        </p:style>
+        <p:txBody>
+          <a:bodyPr rtlCol="0" anchor="ctr"/>
+          <a:lstStyle/>
+          <a:p>
+            <a:pPr algn="ctr"/>
+            <a:endParaRPr lang="en-GB" sz="1200" dirty="0">
+              <a:latin typeface="CMU Serif Roman" panose="02000603000000000000" pitchFamily="2" charset="0"/>
+              <a:ea typeface="CMU Serif Roman" panose="02000603000000000000" pitchFamily="2" charset="0"/>
+              <a:cs typeface="CMU Serif Roman" panose="02000603000000000000" pitchFamily="2" charset="0"/>
+            </a:endParaRPr>
+          </a:p>
+        </p:txBody>
+      </p:sp>
+      <p:sp>
+        <p:nvSpPr>
+          <p:cNvPr id="14" name="Rettangolo 13">
+            <a:extLst>
+              <a:ext uri="{FF2B5EF4-FFF2-40B4-BE49-F238E27FC236}">
+                <a16:creationId xmlns:a16="http://schemas.microsoft.com/office/drawing/2014/main" id="{77CCA7EB-A3B1-4DFB-013F-84193B2B743C}"/>
+              </a:ext>
+            </a:extLst>
+          </p:cNvPr>
+          <p:cNvSpPr/>
+          <p:nvPr/>
+        </p:nvSpPr>
+        <p:spPr>
+          <a:xfrm>
+            <a:off x="4312699" y="5898888"/>
+            <a:ext cx="289932" cy="412595"/>
+          </a:xfrm>
+          <a:prstGeom prst="rect">
+            <a:avLst/>
+          </a:prstGeom>
+          <a:pattFill prst="pct40">
+            <a:fgClr>
+              <a:srgbClr val="00B050"/>
+            </a:fgClr>
+            <a:bgClr>
+              <a:schemeClr val="bg1"/>
+            </a:bgClr>
+          </a:pattFill>
+          <a:ln>
+            <a:solidFill>
+              <a:srgbClr val="00B050"/>
+            </a:solidFill>
+          </a:ln>
+        </p:spPr>
+        <p:style>
+          <a:lnRef idx="2">
+            <a:schemeClr val="accent1">
+              <a:shade val="50000"/>
+            </a:schemeClr>
+          </a:lnRef>
+          <a:fillRef idx="1">
+            <a:schemeClr val="accent1"/>
+          </a:fillRef>
+          <a:effectRef idx="0">
+            <a:schemeClr val="accent1"/>
+          </a:effectRef>
+          <a:fontRef idx="minor">
+            <a:schemeClr val="lt1"/>
+          </a:fontRef>
+        </p:style>
+        <p:txBody>
+          <a:bodyPr rtlCol="0" anchor="ctr"/>
+          <a:lstStyle/>
+          <a:p>
+            <a:pPr algn="ctr"/>
+            <a:endParaRPr lang="en-GB" sz="1200" dirty="0">
+              <a:latin typeface="CMU Serif Roman" panose="02000603000000000000" pitchFamily="2" charset="0"/>
+              <a:ea typeface="CMU Serif Roman" panose="02000603000000000000" pitchFamily="2" charset="0"/>
+              <a:cs typeface="CMU Serif Roman" panose="02000603000000000000" pitchFamily="2" charset="0"/>
+            </a:endParaRPr>
+          </a:p>
+        </p:txBody>
+      </p:sp>
+      <p:sp>
+        <p:nvSpPr>
+          <p:cNvPr id="15" name="CasellaDiTesto 14">
+            <a:extLst>
+              <a:ext uri="{FF2B5EF4-FFF2-40B4-BE49-F238E27FC236}">
+                <a16:creationId xmlns:a16="http://schemas.microsoft.com/office/drawing/2014/main" id="{607B12E4-2A29-14B2-8BC1-5496B178FB4F}"/>
+              </a:ext>
+            </a:extLst>
+          </p:cNvPr>
+          <p:cNvSpPr txBox="1"/>
+          <p:nvPr/>
+        </p:nvSpPr>
+        <p:spPr>
+          <a:xfrm>
+            <a:off x="3524557" y="6476029"/>
+            <a:ext cx="1866217" cy="461665"/>
+          </a:xfrm>
+          <a:prstGeom prst="rect">
+            <a:avLst/>
+          </a:prstGeom>
+          <a:noFill/>
+        </p:spPr>
+        <p:txBody>
+          <a:bodyPr wrap="none" rtlCol="0">
+            <a:spAutoFit/>
+          </a:bodyPr>
+          <a:lstStyle/>
+          <a:p>
+            <a:pPr algn="ctr"/>
+            <a:r>
+              <a:rPr lang="en-GB" sz="1200" dirty="0">
+                <a:latin typeface="CMU Serif Roman" panose="02000603000000000000" pitchFamily="2" charset="0"/>
+                <a:ea typeface="CMU Serif Roman" panose="02000603000000000000" pitchFamily="2" charset="0"/>
+                <a:cs typeface="CMU Serif Roman" panose="02000603000000000000" pitchFamily="2" charset="0"/>
+              </a:rPr>
+              <a:t>Latest values of all </a:t>
+            </a:r>
+          </a:p>
+          <a:p>
+            <a:pPr algn="ctr"/>
+            <a:r>
+              <a:rPr lang="en-GB" sz="1200" dirty="0">
+                <a:latin typeface="CMU Serif Roman" panose="02000603000000000000" pitchFamily="2" charset="0"/>
+                <a:ea typeface="CMU Serif Roman" panose="02000603000000000000" pitchFamily="2" charset="0"/>
+                <a:cs typeface="CMU Serif Roman" panose="02000603000000000000" pitchFamily="2" charset="0"/>
+              </a:rPr>
+              <a:t>the instances of a service</a:t>
+            </a:r>
+          </a:p>
+        </p:txBody>
+      </p:sp>
+      <p:cxnSp>
+        <p:nvCxnSpPr>
+          <p:cNvPr id="16" name="Connettore 2 15">
+            <a:extLst>
+              <a:ext uri="{FF2B5EF4-FFF2-40B4-BE49-F238E27FC236}">
+                <a16:creationId xmlns:a16="http://schemas.microsoft.com/office/drawing/2014/main" id="{C80529EB-D4EC-88CB-23B3-FA74B156C67B}"/>
+              </a:ext>
+            </a:extLst>
+          </p:cNvPr>
+          <p:cNvCxnSpPr>
+            <a:cxnSpLocks/>
+          </p:cNvCxnSpPr>
+          <p:nvPr/>
+        </p:nvCxnSpPr>
+        <p:spPr>
+          <a:xfrm>
+            <a:off x="5434618" y="5797833"/>
+            <a:ext cx="2328126" cy="0"/>
+          </a:xfrm>
+          <a:prstGeom prst="straightConnector1">
+            <a:avLst/>
+          </a:prstGeom>
+          <a:ln>
+            <a:tailEnd type="triangle"/>
+          </a:ln>
+        </p:spPr>
+        <p:style>
+          <a:lnRef idx="1">
+            <a:schemeClr val="accent1"/>
+          </a:lnRef>
+          <a:fillRef idx="0">
+            <a:schemeClr val="accent1"/>
+          </a:fillRef>
+          <a:effectRef idx="0">
+            <a:schemeClr val="accent1"/>
+          </a:effectRef>
+          <a:fontRef idx="minor">
+            <a:schemeClr val="tx1"/>
+          </a:fontRef>
+        </p:style>
+      </p:cxnSp>
+      <p:sp>
+        <p:nvSpPr>
+          <p:cNvPr id="18" name="Rettangolo 17">
+            <a:extLst>
+              <a:ext uri="{FF2B5EF4-FFF2-40B4-BE49-F238E27FC236}">
+                <a16:creationId xmlns:a16="http://schemas.microsoft.com/office/drawing/2014/main" id="{D23BC3F9-26D7-03DD-5686-B38AE422D4D7}"/>
+              </a:ext>
+            </a:extLst>
+          </p:cNvPr>
+          <p:cNvSpPr/>
+          <p:nvPr/>
+        </p:nvSpPr>
+        <p:spPr>
+          <a:xfrm>
+            <a:off x="8122762" y="5594678"/>
+            <a:ext cx="289932" cy="412595"/>
+          </a:xfrm>
+          <a:prstGeom prst="rect">
+            <a:avLst/>
+          </a:prstGeom>
+          <a:pattFill prst="pct40">
+            <a:fgClr>
+              <a:srgbClr val="00B050"/>
+            </a:fgClr>
+            <a:bgClr>
+              <a:schemeClr val="bg1"/>
+            </a:bgClr>
+          </a:pattFill>
+          <a:ln>
+            <a:solidFill>
+              <a:srgbClr val="00B050"/>
+            </a:solidFill>
+          </a:ln>
+        </p:spPr>
+        <p:style>
+          <a:lnRef idx="2">
+            <a:schemeClr val="accent1">
+              <a:shade val="50000"/>
+            </a:schemeClr>
+          </a:lnRef>
+          <a:fillRef idx="1">
+            <a:schemeClr val="accent1"/>
+          </a:fillRef>
+          <a:effectRef idx="0">
+            <a:schemeClr val="accent1"/>
+          </a:effectRef>
+          <a:fontRef idx="minor">
+            <a:schemeClr val="lt1"/>
+          </a:fontRef>
+        </p:style>
+        <p:txBody>
+          <a:bodyPr rtlCol="0" anchor="ctr"/>
+          <a:lstStyle/>
+          <a:p>
+            <a:pPr algn="ctr"/>
+            <a:endParaRPr lang="en-GB" sz="1200" dirty="0">
+              <a:latin typeface="CMU Serif Roman" panose="02000603000000000000" pitchFamily="2" charset="0"/>
+              <a:ea typeface="CMU Serif Roman" panose="02000603000000000000" pitchFamily="2" charset="0"/>
+              <a:cs typeface="CMU Serif Roman" panose="02000603000000000000" pitchFamily="2" charset="0"/>
+            </a:endParaRPr>
+          </a:p>
+        </p:txBody>
+      </p:sp>
+      <p:sp>
+        <p:nvSpPr>
+          <p:cNvPr id="20" name="CasellaDiTesto 19">
+            <a:extLst>
+              <a:ext uri="{FF2B5EF4-FFF2-40B4-BE49-F238E27FC236}">
+                <a16:creationId xmlns:a16="http://schemas.microsoft.com/office/drawing/2014/main" id="{8A22AA15-FE4B-B2B3-8047-4AE2D4DD62B3}"/>
+              </a:ext>
+            </a:extLst>
+          </p:cNvPr>
+          <p:cNvSpPr txBox="1"/>
+          <p:nvPr/>
+        </p:nvSpPr>
+        <p:spPr>
+          <a:xfrm>
+            <a:off x="7481153" y="6065835"/>
+            <a:ext cx="1609736" cy="461665"/>
+          </a:xfrm>
+          <a:prstGeom prst="rect">
+            <a:avLst/>
+          </a:prstGeom>
+          <a:noFill/>
+        </p:spPr>
+        <p:txBody>
+          <a:bodyPr wrap="none" rtlCol="0">
+            <a:spAutoFit/>
+          </a:bodyPr>
+          <a:lstStyle/>
+          <a:p>
+            <a:pPr algn="ctr"/>
+            <a:r>
+              <a:rPr lang="en-GB" sz="1200" dirty="0">
+                <a:latin typeface="CMU Serif Roman" panose="02000603000000000000" pitchFamily="2" charset="0"/>
+                <a:ea typeface="CMU Serif Roman" panose="02000603000000000000" pitchFamily="2" charset="0"/>
+                <a:cs typeface="CMU Serif Roman" panose="02000603000000000000" pitchFamily="2" charset="0"/>
+              </a:rPr>
+              <a:t>new QoS latest value</a:t>
+            </a:r>
+          </a:p>
+          <a:p>
+            <a:pPr algn="ctr"/>
+            <a:r>
+              <a:rPr lang="en-GB" sz="1200" dirty="0">
+                <a:latin typeface="CMU Serif Roman" panose="02000603000000000000" pitchFamily="2" charset="0"/>
+                <a:ea typeface="CMU Serif Roman" panose="02000603000000000000" pitchFamily="2" charset="0"/>
+                <a:cs typeface="CMU Serif Roman" panose="02000603000000000000" pitchFamily="2" charset="0"/>
+              </a:rPr>
+              <a:t>of the service</a:t>
+            </a:r>
+          </a:p>
+        </p:txBody>
+      </p:sp>
+      <p:sp>
+        <p:nvSpPr>
+          <p:cNvPr id="23" name="CasellaDiTesto 22">
+            <a:extLst>
+              <a:ext uri="{FF2B5EF4-FFF2-40B4-BE49-F238E27FC236}">
+                <a16:creationId xmlns:a16="http://schemas.microsoft.com/office/drawing/2014/main" id="{F500FFC5-D77A-E744-1601-395B094F25F2}"/>
+              </a:ext>
+            </a:extLst>
+          </p:cNvPr>
+          <p:cNvSpPr txBox="1"/>
+          <p:nvPr/>
+        </p:nvSpPr>
+        <p:spPr>
+          <a:xfrm>
+            <a:off x="5416829" y="5520834"/>
+            <a:ext cx="2311851" cy="276999"/>
+          </a:xfrm>
+          <a:prstGeom prst="rect">
+            <a:avLst/>
+          </a:prstGeom>
+          <a:noFill/>
+        </p:spPr>
+        <p:txBody>
+          <a:bodyPr wrap="none" rtlCol="0">
+            <a:spAutoFit/>
+          </a:bodyPr>
+          <a:lstStyle/>
+          <a:p>
+            <a:r>
+              <a:rPr lang="en-GB" sz="1200" dirty="0">
+                <a:latin typeface="CMU Serif Roman" panose="02000603000000000000" pitchFamily="2" charset="0"/>
+                <a:ea typeface="CMU Serif Roman" panose="02000603000000000000" pitchFamily="2" charset="0"/>
+                <a:cs typeface="CMU Serif Roman" panose="02000603000000000000" pitchFamily="2" charset="0"/>
+              </a:rPr>
+              <a:t>During each Analysis execution</a:t>
+            </a:r>
+          </a:p>
+        </p:txBody>
+      </p:sp>
+      <p:sp>
+        <p:nvSpPr>
+          <p:cNvPr id="24" name="CasellaDiTesto 23">
+            <a:extLst>
+              <a:ext uri="{FF2B5EF4-FFF2-40B4-BE49-F238E27FC236}">
+                <a16:creationId xmlns:a16="http://schemas.microsoft.com/office/drawing/2014/main" id="{78D925C7-23F3-9680-3A40-50F990199ACC}"/>
+              </a:ext>
+            </a:extLst>
+          </p:cNvPr>
+          <p:cNvSpPr txBox="1"/>
+          <p:nvPr/>
+        </p:nvSpPr>
+        <p:spPr>
+          <a:xfrm>
+            <a:off x="988665" y="5548646"/>
+            <a:ext cx="2565126" cy="461665"/>
+          </a:xfrm>
+          <a:prstGeom prst="rect">
+            <a:avLst/>
+          </a:prstGeom>
+          <a:noFill/>
+        </p:spPr>
+        <p:txBody>
+          <a:bodyPr wrap="none" rtlCol="0">
+            <a:spAutoFit/>
+          </a:bodyPr>
+          <a:lstStyle/>
+          <a:p>
+            <a:pPr algn="r"/>
+            <a:r>
+              <a:rPr lang="en-GB" sz="1200" noProof="1">
+                <a:latin typeface="CMU Serif Roman" panose="02000603000000000000" pitchFamily="2" charset="0"/>
+                <a:ea typeface="CMU Serif Roman" panose="02000603000000000000" pitchFamily="2" charset="0"/>
+                <a:cs typeface="CMU Serif Roman" panose="02000603000000000000" pitchFamily="2" charset="0"/>
+              </a:rPr>
+              <a:t>∀ service with at least one instance</a:t>
+            </a:r>
+          </a:p>
+          <a:p>
+            <a:pPr algn="r"/>
+            <a:r>
+              <a:rPr lang="en-GB" sz="1200" noProof="1">
+                <a:latin typeface="CMU Serif Roman" panose="02000603000000000000" pitchFamily="2" charset="0"/>
+                <a:ea typeface="CMU Serif Roman" panose="02000603000000000000" pitchFamily="2" charset="0"/>
+                <a:cs typeface="CMU Serif Roman" panose="02000603000000000000" pitchFamily="2" charset="0"/>
+              </a:rPr>
+              <a:t>with a new latest value</a:t>
+            </a:r>
+            <a:endParaRPr lang="en-GB" sz="1200" dirty="0">
               <a:latin typeface="CMU Serif Roman" panose="02000603000000000000" pitchFamily="2" charset="0"/>
               <a:ea typeface="CMU Serif Roman" panose="02000603000000000000" pitchFamily="2" charset="0"/>
               <a:cs typeface="CMU Serif Roman" panose="02000603000000000000" pitchFamily="2" charset="0"/>
@@ -9482,10 +10024,10 @@
       </p:sp>
       <p:sp>
         <p:nvSpPr>
-          <p:cNvPr id="19" name="Ovale 18">
-            <a:extLst>
-              <a:ext uri="{FF2B5EF4-FFF2-40B4-BE49-F238E27FC236}">
-                <a16:creationId xmlns:a16="http://schemas.microsoft.com/office/drawing/2014/main" id="{51AE9749-CCDE-4BFD-3ADE-9B3C96246797}"/>
+          <p:cNvPr id="86" name="Rettangolo 85">
+            <a:extLst>
+              <a:ext uri="{FF2B5EF4-FFF2-40B4-BE49-F238E27FC236}">
+                <a16:creationId xmlns:a16="http://schemas.microsoft.com/office/drawing/2014/main" id="{535286B7-E41B-E572-52F2-67A5C76356A8}"/>
               </a:ext>
             </a:extLst>
           </p:cNvPr>
@@ -9494,15 +10036,25 @@
         </p:nvSpPr>
         <p:spPr>
           <a:xfrm>
-            <a:off x="4066882" y="200401"/>
-            <a:ext cx="1308086" cy="1308086"/>
-          </a:xfrm>
-          <a:prstGeom prst="ellipse">
+            <a:off x="4679368" y="3476270"/>
+            <a:ext cx="289932" cy="412595"/>
+          </a:xfrm>
+          <a:prstGeom prst="rect">
             <a:avLst/>
           </a:prstGeom>
-          <a:solidFill>
-            <a:schemeClr val="bg1"/>
-          </a:solidFill>
+          <a:pattFill prst="pct40">
+            <a:fgClr>
+              <a:srgbClr val="FF0000"/>
+            </a:fgClr>
+            <a:bgClr>
+              <a:schemeClr val="bg1"/>
+            </a:bgClr>
+          </a:pattFill>
+          <a:ln>
+            <a:solidFill>
+              <a:srgbClr val="FF0000"/>
+            </a:solidFill>
+          </a:ln>
         </p:spPr>
         <p:style>
           <a:lnRef idx="2">
@@ -9525,7 +10077,7 @@
           <a:lstStyle/>
           <a:p>
             <a:pPr algn="ctr"/>
-            <a:endParaRPr lang="en-GB" sz="1200">
+            <a:endParaRPr lang="en-GB" sz="1200" dirty="0">
               <a:latin typeface="CMU Serif Roman" panose="02000603000000000000" pitchFamily="2" charset="0"/>
               <a:ea typeface="CMU Serif Roman" panose="02000603000000000000" pitchFamily="2" charset="0"/>
               <a:cs typeface="CMU Serif Roman" panose="02000603000000000000" pitchFamily="2" charset="0"/>
@@ -9535,10 +10087,10 @@
       </p:sp>
       <p:sp>
         <p:nvSpPr>
-          <p:cNvPr id="26" name="Rettangolo 25">
-            <a:extLst>
-              <a:ext uri="{FF2B5EF4-FFF2-40B4-BE49-F238E27FC236}">
-                <a16:creationId xmlns:a16="http://schemas.microsoft.com/office/drawing/2014/main" id="{5F7C4F12-D6EA-CCB1-82F4-C4461B23AECA}"/>
+          <p:cNvPr id="87" name="Rettangolo 86">
+            <a:extLst>
+              <a:ext uri="{FF2B5EF4-FFF2-40B4-BE49-F238E27FC236}">
+                <a16:creationId xmlns:a16="http://schemas.microsoft.com/office/drawing/2014/main" id="{03EB2BCD-0ECF-D653-E549-F9E7CB777859}"/>
               </a:ext>
             </a:extLst>
           </p:cNvPr>
@@ -9547,7 +10099,1004 @@
         </p:nvSpPr>
         <p:spPr>
           <a:xfrm>
-            <a:off x="4297603" y="429971"/>
+            <a:off x="5189120" y="3476270"/>
+            <a:ext cx="289932" cy="412595"/>
+          </a:xfrm>
+          <a:prstGeom prst="rect">
+            <a:avLst/>
+          </a:prstGeom>
+          <a:pattFill prst="pct40">
+            <a:fgClr>
+              <a:srgbClr val="FF0000"/>
+            </a:fgClr>
+            <a:bgClr>
+              <a:schemeClr val="bg1"/>
+            </a:bgClr>
+          </a:pattFill>
+          <a:ln>
+            <a:solidFill>
+              <a:srgbClr val="FF0000"/>
+            </a:solidFill>
+          </a:ln>
+        </p:spPr>
+        <p:style>
+          <a:lnRef idx="2">
+            <a:schemeClr val="accent1">
+              <a:shade val="50000"/>
+            </a:schemeClr>
+          </a:lnRef>
+          <a:fillRef idx="1">
+            <a:schemeClr val="accent1"/>
+          </a:fillRef>
+          <a:effectRef idx="0">
+            <a:schemeClr val="accent1"/>
+          </a:effectRef>
+          <a:fontRef idx="minor">
+            <a:schemeClr val="lt1"/>
+          </a:fontRef>
+        </p:style>
+        <p:txBody>
+          <a:bodyPr rtlCol="0" anchor="ctr"/>
+          <a:lstStyle/>
+          <a:p>
+            <a:pPr algn="ctr"/>
+            <a:endParaRPr lang="en-GB" sz="1200" dirty="0">
+              <a:latin typeface="CMU Serif Roman" panose="02000603000000000000" pitchFamily="2" charset="0"/>
+              <a:ea typeface="CMU Serif Roman" panose="02000603000000000000" pitchFamily="2" charset="0"/>
+              <a:cs typeface="CMU Serif Roman" panose="02000603000000000000" pitchFamily="2" charset="0"/>
+            </a:endParaRPr>
+          </a:p>
+        </p:txBody>
+      </p:sp>
+      <p:sp>
+        <p:nvSpPr>
+          <p:cNvPr id="88" name="CasellaDiTesto 87">
+            <a:extLst>
+              <a:ext uri="{FF2B5EF4-FFF2-40B4-BE49-F238E27FC236}">
+                <a16:creationId xmlns:a16="http://schemas.microsoft.com/office/drawing/2014/main" id="{6C3509C8-C573-DDFD-07C8-612FFE1A1135}"/>
+              </a:ext>
+            </a:extLst>
+          </p:cNvPr>
+          <p:cNvSpPr txBox="1"/>
+          <p:nvPr/>
+        </p:nvSpPr>
+        <p:spPr>
+          <a:xfrm>
+            <a:off x="5635919" y="3636185"/>
+            <a:ext cx="377026" cy="369332"/>
+          </a:xfrm>
+          <a:prstGeom prst="rect">
+            <a:avLst/>
+          </a:prstGeom>
+          <a:noFill/>
+        </p:spPr>
+        <p:txBody>
+          <a:bodyPr wrap="none" rtlCol="0">
+            <a:spAutoFit/>
+          </a:bodyPr>
+          <a:lstStyle/>
+          <a:p>
+            <a:r>
+              <a:rPr lang="en-GB" dirty="0">
+                <a:latin typeface="CMU Serif Roman" panose="02000603000000000000" pitchFamily="2" charset="0"/>
+                <a:ea typeface="CMU Serif Roman" panose="02000603000000000000" pitchFamily="2" charset="0"/>
+                <a:cs typeface="CMU Serif Roman" panose="02000603000000000000" pitchFamily="2" charset="0"/>
+              </a:rPr>
+              <a:t>…</a:t>
+            </a:r>
+          </a:p>
+        </p:txBody>
+      </p:sp>
+      <p:sp>
+        <p:nvSpPr>
+          <p:cNvPr id="89" name="Rettangolo 88">
+            <a:extLst>
+              <a:ext uri="{FF2B5EF4-FFF2-40B4-BE49-F238E27FC236}">
+                <a16:creationId xmlns:a16="http://schemas.microsoft.com/office/drawing/2014/main" id="{4CB2A7DB-F467-55F6-0971-732643CADE87}"/>
+              </a:ext>
+            </a:extLst>
+          </p:cNvPr>
+          <p:cNvSpPr/>
+          <p:nvPr/>
+        </p:nvSpPr>
+        <p:spPr>
+          <a:xfrm>
+            <a:off x="6153421" y="3476270"/>
+            <a:ext cx="289932" cy="412595"/>
+          </a:xfrm>
+          <a:prstGeom prst="rect">
+            <a:avLst/>
+          </a:prstGeom>
+          <a:pattFill prst="pct40">
+            <a:fgClr>
+              <a:srgbClr val="FF0000"/>
+            </a:fgClr>
+            <a:bgClr>
+              <a:schemeClr val="bg1"/>
+            </a:bgClr>
+          </a:pattFill>
+          <a:ln>
+            <a:solidFill>
+              <a:srgbClr val="FF0000"/>
+            </a:solidFill>
+          </a:ln>
+        </p:spPr>
+        <p:style>
+          <a:lnRef idx="2">
+            <a:schemeClr val="accent1">
+              <a:shade val="50000"/>
+            </a:schemeClr>
+          </a:lnRef>
+          <a:fillRef idx="1">
+            <a:schemeClr val="accent1"/>
+          </a:fillRef>
+          <a:effectRef idx="0">
+            <a:schemeClr val="accent1"/>
+          </a:effectRef>
+          <a:fontRef idx="minor">
+            <a:schemeClr val="lt1"/>
+          </a:fontRef>
+        </p:style>
+        <p:txBody>
+          <a:bodyPr rtlCol="0" anchor="ctr"/>
+          <a:lstStyle/>
+          <a:p>
+            <a:pPr algn="ctr"/>
+            <a:endParaRPr lang="en-GB" sz="1200" dirty="0">
+              <a:latin typeface="CMU Serif Roman" panose="02000603000000000000" pitchFamily="2" charset="0"/>
+              <a:ea typeface="CMU Serif Roman" panose="02000603000000000000" pitchFamily="2" charset="0"/>
+              <a:cs typeface="CMU Serif Roman" panose="02000603000000000000" pitchFamily="2" charset="0"/>
+            </a:endParaRPr>
+          </a:p>
+        </p:txBody>
+      </p:sp>
+      <p:sp>
+        <p:nvSpPr>
+          <p:cNvPr id="90" name="Rettangolo 89">
+            <a:extLst>
+              <a:ext uri="{FF2B5EF4-FFF2-40B4-BE49-F238E27FC236}">
+                <a16:creationId xmlns:a16="http://schemas.microsoft.com/office/drawing/2014/main" id="{8F5D39CA-6351-CC93-E09F-2B4064A4D7E6}"/>
+              </a:ext>
+            </a:extLst>
+          </p:cNvPr>
+          <p:cNvSpPr/>
+          <p:nvPr/>
+        </p:nvSpPr>
+        <p:spPr>
+          <a:xfrm>
+            <a:off x="3264956" y="3476270"/>
+            <a:ext cx="289932" cy="412595"/>
+          </a:xfrm>
+          <a:prstGeom prst="rect">
+            <a:avLst/>
+          </a:prstGeom>
+          <a:pattFill prst="pct40">
+            <a:fgClr>
+              <a:srgbClr val="FF0000"/>
+            </a:fgClr>
+            <a:bgClr>
+              <a:schemeClr val="bg1"/>
+            </a:bgClr>
+          </a:pattFill>
+          <a:ln>
+            <a:solidFill>
+              <a:srgbClr val="FF0000"/>
+            </a:solidFill>
+          </a:ln>
+        </p:spPr>
+        <p:style>
+          <a:lnRef idx="2">
+            <a:schemeClr val="accent1">
+              <a:shade val="50000"/>
+            </a:schemeClr>
+          </a:lnRef>
+          <a:fillRef idx="1">
+            <a:schemeClr val="accent1"/>
+          </a:fillRef>
+          <a:effectRef idx="0">
+            <a:schemeClr val="accent1"/>
+          </a:effectRef>
+          <a:fontRef idx="minor">
+            <a:schemeClr val="lt1"/>
+          </a:fontRef>
+        </p:style>
+        <p:txBody>
+          <a:bodyPr rtlCol="0" anchor="ctr"/>
+          <a:lstStyle/>
+          <a:p>
+            <a:pPr algn="ctr"/>
+            <a:endParaRPr lang="en-GB" sz="1200" dirty="0">
+              <a:latin typeface="CMU Serif Roman" panose="02000603000000000000" pitchFamily="2" charset="0"/>
+              <a:ea typeface="CMU Serif Roman" panose="02000603000000000000" pitchFamily="2" charset="0"/>
+              <a:cs typeface="CMU Serif Roman" panose="02000603000000000000" pitchFamily="2" charset="0"/>
+            </a:endParaRPr>
+          </a:p>
+        </p:txBody>
+      </p:sp>
+      <p:sp>
+        <p:nvSpPr>
+          <p:cNvPr id="92" name="CasellaDiTesto 91">
+            <a:extLst>
+              <a:ext uri="{FF2B5EF4-FFF2-40B4-BE49-F238E27FC236}">
+                <a16:creationId xmlns:a16="http://schemas.microsoft.com/office/drawing/2014/main" id="{D2265E0A-0D79-0082-89A6-3C5D10E0889E}"/>
+              </a:ext>
+            </a:extLst>
+          </p:cNvPr>
+          <p:cNvSpPr txBox="1"/>
+          <p:nvPr/>
+        </p:nvSpPr>
+        <p:spPr>
+          <a:xfrm>
+            <a:off x="3677346" y="3636185"/>
+            <a:ext cx="377026" cy="369332"/>
+          </a:xfrm>
+          <a:prstGeom prst="rect">
+            <a:avLst/>
+          </a:prstGeom>
+          <a:noFill/>
+        </p:spPr>
+        <p:txBody>
+          <a:bodyPr wrap="none" rtlCol="0">
+            <a:spAutoFit/>
+          </a:bodyPr>
+          <a:lstStyle/>
+          <a:p>
+            <a:r>
+              <a:rPr lang="en-GB" dirty="0">
+                <a:latin typeface="CMU Serif Roman" panose="02000603000000000000" pitchFamily="2" charset="0"/>
+                <a:ea typeface="CMU Serif Roman" panose="02000603000000000000" pitchFamily="2" charset="0"/>
+                <a:cs typeface="CMU Serif Roman" panose="02000603000000000000" pitchFamily="2" charset="0"/>
+              </a:rPr>
+              <a:t>…</a:t>
+            </a:r>
+          </a:p>
+        </p:txBody>
+      </p:sp>
+      <p:sp>
+        <p:nvSpPr>
+          <p:cNvPr id="93" name="Rettangolo 92">
+            <a:extLst>
+              <a:ext uri="{FF2B5EF4-FFF2-40B4-BE49-F238E27FC236}">
+                <a16:creationId xmlns:a16="http://schemas.microsoft.com/office/drawing/2014/main" id="{790DC27D-71AC-4C28-E72B-A7B794063AF9}"/>
+              </a:ext>
+            </a:extLst>
+          </p:cNvPr>
+          <p:cNvSpPr/>
+          <p:nvPr/>
+        </p:nvSpPr>
+        <p:spPr>
+          <a:xfrm>
+            <a:off x="4176896" y="3476270"/>
+            <a:ext cx="289932" cy="412595"/>
+          </a:xfrm>
+          <a:prstGeom prst="rect">
+            <a:avLst/>
+          </a:prstGeom>
+          <a:pattFill prst="pct40">
+            <a:fgClr>
+              <a:srgbClr val="FF0000"/>
+            </a:fgClr>
+            <a:bgClr>
+              <a:schemeClr val="bg1"/>
+            </a:bgClr>
+          </a:pattFill>
+          <a:ln>
+            <a:solidFill>
+              <a:srgbClr val="FF0000"/>
+            </a:solidFill>
+          </a:ln>
+        </p:spPr>
+        <p:style>
+          <a:lnRef idx="2">
+            <a:schemeClr val="accent1">
+              <a:shade val="50000"/>
+            </a:schemeClr>
+          </a:lnRef>
+          <a:fillRef idx="1">
+            <a:schemeClr val="accent1"/>
+          </a:fillRef>
+          <a:effectRef idx="0">
+            <a:schemeClr val="accent1"/>
+          </a:effectRef>
+          <a:fontRef idx="minor">
+            <a:schemeClr val="lt1"/>
+          </a:fontRef>
+        </p:style>
+        <p:txBody>
+          <a:bodyPr rtlCol="0" anchor="ctr"/>
+          <a:lstStyle/>
+          <a:p>
+            <a:pPr algn="ctr"/>
+            <a:endParaRPr lang="en-GB" sz="1200" dirty="0">
+              <a:latin typeface="CMU Serif Roman" panose="02000603000000000000" pitchFamily="2" charset="0"/>
+              <a:ea typeface="CMU Serif Roman" panose="02000603000000000000" pitchFamily="2" charset="0"/>
+              <a:cs typeface="CMU Serif Roman" panose="02000603000000000000" pitchFamily="2" charset="0"/>
+            </a:endParaRPr>
+          </a:p>
+        </p:txBody>
+      </p:sp>
+      <p:sp>
+        <p:nvSpPr>
+          <p:cNvPr id="11" name="CasellaDiTesto 10">
+            <a:extLst>
+              <a:ext uri="{FF2B5EF4-FFF2-40B4-BE49-F238E27FC236}">
+                <a16:creationId xmlns:a16="http://schemas.microsoft.com/office/drawing/2014/main" id="{DE11A1A7-639A-9D21-048A-A92A1F17C430}"/>
+              </a:ext>
+            </a:extLst>
+          </p:cNvPr>
+          <p:cNvSpPr txBox="1"/>
+          <p:nvPr/>
+        </p:nvSpPr>
+        <p:spPr>
+          <a:xfrm>
+            <a:off x="1413097" y="2355285"/>
+            <a:ext cx="1683474" cy="461665"/>
+          </a:xfrm>
+          <a:prstGeom prst="rect">
+            <a:avLst/>
+          </a:prstGeom>
+          <a:noFill/>
+        </p:spPr>
+        <p:txBody>
+          <a:bodyPr wrap="none" rtlCol="0">
+            <a:spAutoFit/>
+          </a:bodyPr>
+          <a:lstStyle/>
+          <a:p>
+            <a:pPr algn="r"/>
+            <a:r>
+              <a:rPr lang="en-GB" sz="1200" noProof="1">
+                <a:latin typeface="CMU Serif Roman" panose="02000603000000000000" pitchFamily="2" charset="0"/>
+                <a:ea typeface="CMU Serif Roman" panose="02000603000000000000" pitchFamily="2" charset="0"/>
+                <a:cs typeface="CMU Serif Roman" panose="02000603000000000000" pitchFamily="2" charset="0"/>
+              </a:rPr>
+              <a:t>∀ service with at least</a:t>
+            </a:r>
+          </a:p>
+          <a:p>
+            <a:pPr algn="r"/>
+            <a:r>
+              <a:rPr lang="en-GB" sz="1200" noProof="1">
+                <a:latin typeface="CMU Concrete Roman" panose="02000603000000000000" pitchFamily="2" charset="0"/>
+                <a:ea typeface="CMU Concrete Roman" panose="02000603000000000000" pitchFamily="2" charset="0"/>
+                <a:cs typeface="CMU Concrete Roman" panose="02000603000000000000" pitchFamily="2" charset="0"/>
+              </a:rPr>
+              <a:t>k=AWS</a:t>
+            </a:r>
+            <a:r>
+              <a:rPr lang="en-GB" sz="1200" noProof="1">
+                <a:latin typeface="CMU Serif Roman" panose="02000603000000000000" pitchFamily="2" charset="0"/>
+                <a:ea typeface="CMU Serif Roman" panose="02000603000000000000" pitchFamily="2" charset="0"/>
+                <a:cs typeface="CMU Serif Roman" panose="02000603000000000000" pitchFamily="2" charset="0"/>
+              </a:rPr>
+              <a:t> valid values</a:t>
+            </a:r>
+            <a:endParaRPr lang="en-GB" sz="1200" dirty="0">
+              <a:latin typeface="CMU Serif Roman" panose="02000603000000000000" pitchFamily="2" charset="0"/>
+              <a:ea typeface="CMU Serif Roman" panose="02000603000000000000" pitchFamily="2" charset="0"/>
+              <a:cs typeface="CMU Serif Roman" panose="02000603000000000000" pitchFamily="2" charset="0"/>
+            </a:endParaRPr>
+          </a:p>
+        </p:txBody>
+      </p:sp>
+      <p:sp>
+        <p:nvSpPr>
+          <p:cNvPr id="12" name="CasellaDiTesto 11">
+            <a:extLst>
+              <a:ext uri="{FF2B5EF4-FFF2-40B4-BE49-F238E27FC236}">
+                <a16:creationId xmlns:a16="http://schemas.microsoft.com/office/drawing/2014/main" id="{928F3205-50A0-EDB3-F989-467F34DCB4A2}"/>
+              </a:ext>
+            </a:extLst>
+          </p:cNvPr>
+          <p:cNvSpPr txBox="1"/>
+          <p:nvPr/>
+        </p:nvSpPr>
+        <p:spPr>
+          <a:xfrm>
+            <a:off x="2389326" y="3549008"/>
+            <a:ext cx="729687" cy="276999"/>
+          </a:xfrm>
+          <a:prstGeom prst="rect">
+            <a:avLst/>
+          </a:prstGeom>
+          <a:noFill/>
+        </p:spPr>
+        <p:txBody>
+          <a:bodyPr wrap="none" rtlCol="0">
+            <a:spAutoFit/>
+          </a:bodyPr>
+          <a:lstStyle/>
+          <a:p>
+            <a:pPr algn="ctr"/>
+            <a:r>
+              <a:rPr lang="en-GB" sz="1200" noProof="1">
+                <a:latin typeface="CMU Serif Roman" panose="02000603000000000000" pitchFamily="2" charset="0"/>
+                <a:ea typeface="CMU Serif Roman" panose="02000603000000000000" pitchFamily="2" charset="0"/>
+                <a:cs typeface="CMU Serif Roman" panose="02000603000000000000" pitchFamily="2" charset="0"/>
+              </a:rPr>
+              <a:t>AFTER</a:t>
+            </a:r>
+            <a:endParaRPr lang="en-GB" sz="1200" dirty="0">
+              <a:latin typeface="CMU Serif Roman" panose="02000603000000000000" pitchFamily="2" charset="0"/>
+              <a:ea typeface="CMU Serif Roman" panose="02000603000000000000" pitchFamily="2" charset="0"/>
+              <a:cs typeface="CMU Serif Roman" panose="02000603000000000000" pitchFamily="2" charset="0"/>
+            </a:endParaRPr>
+          </a:p>
+        </p:txBody>
+      </p:sp>
+      <p:sp>
+        <p:nvSpPr>
+          <p:cNvPr id="13" name="Rettangolo 12">
+            <a:extLst>
+              <a:ext uri="{FF2B5EF4-FFF2-40B4-BE49-F238E27FC236}">
+                <a16:creationId xmlns:a16="http://schemas.microsoft.com/office/drawing/2014/main" id="{27C4A987-B36B-E39C-DE2A-D8976C54584A}"/>
+              </a:ext>
+            </a:extLst>
+          </p:cNvPr>
+          <p:cNvSpPr/>
+          <p:nvPr/>
+        </p:nvSpPr>
+        <p:spPr>
+          <a:xfrm>
+            <a:off x="4679368" y="5623899"/>
+            <a:ext cx="289932" cy="412595"/>
+          </a:xfrm>
+          <a:prstGeom prst="rect">
+            <a:avLst/>
+          </a:prstGeom>
+          <a:pattFill prst="pct40">
+            <a:fgClr>
+              <a:srgbClr val="FF0000"/>
+            </a:fgClr>
+            <a:bgClr>
+              <a:schemeClr val="bg1"/>
+            </a:bgClr>
+          </a:pattFill>
+          <a:ln>
+            <a:solidFill>
+              <a:srgbClr val="FF0000"/>
+            </a:solidFill>
+          </a:ln>
+        </p:spPr>
+        <p:style>
+          <a:lnRef idx="2">
+            <a:schemeClr val="accent1">
+              <a:shade val="50000"/>
+            </a:schemeClr>
+          </a:lnRef>
+          <a:fillRef idx="1">
+            <a:schemeClr val="accent1"/>
+          </a:fillRef>
+          <a:effectRef idx="0">
+            <a:schemeClr val="accent1"/>
+          </a:effectRef>
+          <a:fontRef idx="minor">
+            <a:schemeClr val="lt1"/>
+          </a:fontRef>
+        </p:style>
+        <p:txBody>
+          <a:bodyPr rtlCol="0" anchor="ctr"/>
+          <a:lstStyle/>
+          <a:p>
+            <a:pPr algn="ctr"/>
+            <a:endParaRPr lang="en-GB" sz="1200" dirty="0">
+              <a:latin typeface="CMU Serif Roman" panose="02000603000000000000" pitchFamily="2" charset="0"/>
+              <a:ea typeface="CMU Serif Roman" panose="02000603000000000000" pitchFamily="2" charset="0"/>
+              <a:cs typeface="CMU Serif Roman" panose="02000603000000000000" pitchFamily="2" charset="0"/>
+            </a:endParaRPr>
+          </a:p>
+        </p:txBody>
+      </p:sp>
+      <p:sp>
+        <p:nvSpPr>
+          <p:cNvPr id="14" name="Rettangolo 13">
+            <a:extLst>
+              <a:ext uri="{FF2B5EF4-FFF2-40B4-BE49-F238E27FC236}">
+                <a16:creationId xmlns:a16="http://schemas.microsoft.com/office/drawing/2014/main" id="{51A1277A-4F8C-679F-196E-C79CD8D7F40C}"/>
+              </a:ext>
+            </a:extLst>
+          </p:cNvPr>
+          <p:cNvSpPr/>
+          <p:nvPr/>
+        </p:nvSpPr>
+        <p:spPr>
+          <a:xfrm>
+            <a:off x="5189120" y="5623899"/>
+            <a:ext cx="289932" cy="412595"/>
+          </a:xfrm>
+          <a:prstGeom prst="rect">
+            <a:avLst/>
+          </a:prstGeom>
+          <a:pattFill prst="pct40">
+            <a:fgClr>
+              <a:srgbClr val="FF0000"/>
+            </a:fgClr>
+            <a:bgClr>
+              <a:schemeClr val="bg1"/>
+            </a:bgClr>
+          </a:pattFill>
+          <a:ln>
+            <a:solidFill>
+              <a:srgbClr val="FF0000"/>
+            </a:solidFill>
+          </a:ln>
+        </p:spPr>
+        <p:style>
+          <a:lnRef idx="2">
+            <a:schemeClr val="accent1">
+              <a:shade val="50000"/>
+            </a:schemeClr>
+          </a:lnRef>
+          <a:fillRef idx="1">
+            <a:schemeClr val="accent1"/>
+          </a:fillRef>
+          <a:effectRef idx="0">
+            <a:schemeClr val="accent1"/>
+          </a:effectRef>
+          <a:fontRef idx="minor">
+            <a:schemeClr val="lt1"/>
+          </a:fontRef>
+        </p:style>
+        <p:txBody>
+          <a:bodyPr rtlCol="0" anchor="ctr"/>
+          <a:lstStyle/>
+          <a:p>
+            <a:pPr algn="ctr"/>
+            <a:endParaRPr lang="en-GB" sz="1200" dirty="0">
+              <a:latin typeface="CMU Serif Roman" panose="02000603000000000000" pitchFamily="2" charset="0"/>
+              <a:ea typeface="CMU Serif Roman" panose="02000603000000000000" pitchFamily="2" charset="0"/>
+              <a:cs typeface="CMU Serif Roman" panose="02000603000000000000" pitchFamily="2" charset="0"/>
+            </a:endParaRPr>
+          </a:p>
+        </p:txBody>
+      </p:sp>
+      <p:sp>
+        <p:nvSpPr>
+          <p:cNvPr id="15" name="CasellaDiTesto 14">
+            <a:extLst>
+              <a:ext uri="{FF2B5EF4-FFF2-40B4-BE49-F238E27FC236}">
+                <a16:creationId xmlns:a16="http://schemas.microsoft.com/office/drawing/2014/main" id="{C3AD82F8-6BE1-77F9-5AB5-D26B6D1D2CB5}"/>
+              </a:ext>
+            </a:extLst>
+          </p:cNvPr>
+          <p:cNvSpPr txBox="1"/>
+          <p:nvPr/>
+        </p:nvSpPr>
+        <p:spPr>
+          <a:xfrm>
+            <a:off x="5635919" y="5783814"/>
+            <a:ext cx="377026" cy="369332"/>
+          </a:xfrm>
+          <a:prstGeom prst="rect">
+            <a:avLst/>
+          </a:prstGeom>
+          <a:noFill/>
+        </p:spPr>
+        <p:txBody>
+          <a:bodyPr wrap="none" rtlCol="0">
+            <a:spAutoFit/>
+          </a:bodyPr>
+          <a:lstStyle/>
+          <a:p>
+            <a:r>
+              <a:rPr lang="en-GB" dirty="0">
+                <a:latin typeface="CMU Serif Roman" panose="02000603000000000000" pitchFamily="2" charset="0"/>
+                <a:ea typeface="CMU Serif Roman" panose="02000603000000000000" pitchFamily="2" charset="0"/>
+                <a:cs typeface="CMU Serif Roman" panose="02000603000000000000" pitchFamily="2" charset="0"/>
+              </a:rPr>
+              <a:t>…</a:t>
+            </a:r>
+          </a:p>
+        </p:txBody>
+      </p:sp>
+      <p:sp>
+        <p:nvSpPr>
+          <p:cNvPr id="16" name="Rettangolo 15">
+            <a:extLst>
+              <a:ext uri="{FF2B5EF4-FFF2-40B4-BE49-F238E27FC236}">
+                <a16:creationId xmlns:a16="http://schemas.microsoft.com/office/drawing/2014/main" id="{CE76E69C-98C4-933A-910B-6050544EE37D}"/>
+              </a:ext>
+            </a:extLst>
+          </p:cNvPr>
+          <p:cNvSpPr/>
+          <p:nvPr/>
+        </p:nvSpPr>
+        <p:spPr>
+          <a:xfrm>
+            <a:off x="6153421" y="5623899"/>
+            <a:ext cx="289932" cy="412595"/>
+          </a:xfrm>
+          <a:prstGeom prst="rect">
+            <a:avLst/>
+          </a:prstGeom>
+          <a:pattFill prst="pct40">
+            <a:fgClr>
+              <a:srgbClr val="FF0000"/>
+            </a:fgClr>
+            <a:bgClr>
+              <a:schemeClr val="bg1"/>
+            </a:bgClr>
+          </a:pattFill>
+          <a:ln>
+            <a:solidFill>
+              <a:srgbClr val="FF0000"/>
+            </a:solidFill>
+          </a:ln>
+        </p:spPr>
+        <p:style>
+          <a:lnRef idx="2">
+            <a:schemeClr val="accent1">
+              <a:shade val="50000"/>
+            </a:schemeClr>
+          </a:lnRef>
+          <a:fillRef idx="1">
+            <a:schemeClr val="accent1"/>
+          </a:fillRef>
+          <a:effectRef idx="0">
+            <a:schemeClr val="accent1"/>
+          </a:effectRef>
+          <a:fontRef idx="minor">
+            <a:schemeClr val="lt1"/>
+          </a:fontRef>
+        </p:style>
+        <p:txBody>
+          <a:bodyPr rtlCol="0" anchor="ctr"/>
+          <a:lstStyle/>
+          <a:p>
+            <a:pPr algn="ctr"/>
+            <a:endParaRPr lang="en-GB" sz="1200" dirty="0">
+              <a:latin typeface="CMU Serif Roman" panose="02000603000000000000" pitchFamily="2" charset="0"/>
+              <a:ea typeface="CMU Serif Roman" panose="02000603000000000000" pitchFamily="2" charset="0"/>
+              <a:cs typeface="CMU Serif Roman" panose="02000603000000000000" pitchFamily="2" charset="0"/>
+            </a:endParaRPr>
+          </a:p>
+        </p:txBody>
+      </p:sp>
+      <p:sp>
+        <p:nvSpPr>
+          <p:cNvPr id="17" name="Rettangolo 16">
+            <a:extLst>
+              <a:ext uri="{FF2B5EF4-FFF2-40B4-BE49-F238E27FC236}">
+                <a16:creationId xmlns:a16="http://schemas.microsoft.com/office/drawing/2014/main" id="{7541B3DA-F3DA-1AAF-5C8A-7D67BA240AEF}"/>
+              </a:ext>
+            </a:extLst>
+          </p:cNvPr>
+          <p:cNvSpPr/>
+          <p:nvPr/>
+        </p:nvSpPr>
+        <p:spPr>
+          <a:xfrm>
+            <a:off x="3264956" y="5619373"/>
+            <a:ext cx="289932" cy="412595"/>
+          </a:xfrm>
+          <a:prstGeom prst="rect">
+            <a:avLst/>
+          </a:prstGeom>
+          <a:pattFill prst="pct40">
+            <a:fgClr>
+              <a:srgbClr val="FF0000"/>
+            </a:fgClr>
+            <a:bgClr>
+              <a:schemeClr val="bg1"/>
+            </a:bgClr>
+          </a:pattFill>
+          <a:ln>
+            <a:solidFill>
+              <a:srgbClr val="FF0000"/>
+            </a:solidFill>
+          </a:ln>
+        </p:spPr>
+        <p:style>
+          <a:lnRef idx="2">
+            <a:schemeClr val="accent1">
+              <a:shade val="50000"/>
+            </a:schemeClr>
+          </a:lnRef>
+          <a:fillRef idx="1">
+            <a:schemeClr val="accent1"/>
+          </a:fillRef>
+          <a:effectRef idx="0">
+            <a:schemeClr val="accent1"/>
+          </a:effectRef>
+          <a:fontRef idx="minor">
+            <a:schemeClr val="lt1"/>
+          </a:fontRef>
+        </p:style>
+        <p:txBody>
+          <a:bodyPr rtlCol="0" anchor="ctr"/>
+          <a:lstStyle/>
+          <a:p>
+            <a:pPr algn="ctr"/>
+            <a:endParaRPr lang="en-GB" sz="1200" dirty="0">
+              <a:latin typeface="CMU Serif Roman" panose="02000603000000000000" pitchFamily="2" charset="0"/>
+              <a:ea typeface="CMU Serif Roman" panose="02000603000000000000" pitchFamily="2" charset="0"/>
+              <a:cs typeface="CMU Serif Roman" panose="02000603000000000000" pitchFamily="2" charset="0"/>
+            </a:endParaRPr>
+          </a:p>
+        </p:txBody>
+      </p:sp>
+      <p:sp>
+        <p:nvSpPr>
+          <p:cNvPr id="18" name="CasellaDiTesto 17">
+            <a:extLst>
+              <a:ext uri="{FF2B5EF4-FFF2-40B4-BE49-F238E27FC236}">
+                <a16:creationId xmlns:a16="http://schemas.microsoft.com/office/drawing/2014/main" id="{2132E438-A487-3B99-476C-86257AAD87F4}"/>
+              </a:ext>
+            </a:extLst>
+          </p:cNvPr>
+          <p:cNvSpPr txBox="1"/>
+          <p:nvPr/>
+        </p:nvSpPr>
+        <p:spPr>
+          <a:xfrm>
+            <a:off x="3677346" y="5783814"/>
+            <a:ext cx="377026" cy="369332"/>
+          </a:xfrm>
+          <a:prstGeom prst="rect">
+            <a:avLst/>
+          </a:prstGeom>
+          <a:noFill/>
+        </p:spPr>
+        <p:txBody>
+          <a:bodyPr wrap="none" rtlCol="0">
+            <a:spAutoFit/>
+          </a:bodyPr>
+          <a:lstStyle/>
+          <a:p>
+            <a:r>
+              <a:rPr lang="en-GB" dirty="0">
+                <a:latin typeface="CMU Serif Roman" panose="02000603000000000000" pitchFamily="2" charset="0"/>
+                <a:ea typeface="CMU Serif Roman" panose="02000603000000000000" pitchFamily="2" charset="0"/>
+                <a:cs typeface="CMU Serif Roman" panose="02000603000000000000" pitchFamily="2" charset="0"/>
+              </a:rPr>
+              <a:t>…</a:t>
+            </a:r>
+          </a:p>
+        </p:txBody>
+      </p:sp>
+      <p:sp>
+        <p:nvSpPr>
+          <p:cNvPr id="20" name="Rettangolo 19">
+            <a:extLst>
+              <a:ext uri="{FF2B5EF4-FFF2-40B4-BE49-F238E27FC236}">
+                <a16:creationId xmlns:a16="http://schemas.microsoft.com/office/drawing/2014/main" id="{7FFBC33B-D036-AA79-1797-EE84D1FDA8C1}"/>
+              </a:ext>
+            </a:extLst>
+          </p:cNvPr>
+          <p:cNvSpPr/>
+          <p:nvPr/>
+        </p:nvSpPr>
+        <p:spPr>
+          <a:xfrm>
+            <a:off x="4176896" y="5623899"/>
+            <a:ext cx="289932" cy="412595"/>
+          </a:xfrm>
+          <a:prstGeom prst="rect">
+            <a:avLst/>
+          </a:prstGeom>
+          <a:pattFill prst="pct40">
+            <a:fgClr>
+              <a:srgbClr val="FF0000"/>
+            </a:fgClr>
+            <a:bgClr>
+              <a:schemeClr val="bg1"/>
+            </a:bgClr>
+          </a:pattFill>
+          <a:ln>
+            <a:solidFill>
+              <a:srgbClr val="FF0000"/>
+            </a:solidFill>
+          </a:ln>
+        </p:spPr>
+        <p:style>
+          <a:lnRef idx="2">
+            <a:schemeClr val="accent1">
+              <a:shade val="50000"/>
+            </a:schemeClr>
+          </a:lnRef>
+          <a:fillRef idx="1">
+            <a:schemeClr val="accent1"/>
+          </a:fillRef>
+          <a:effectRef idx="0">
+            <a:schemeClr val="accent1"/>
+          </a:effectRef>
+          <a:fontRef idx="minor">
+            <a:schemeClr val="lt1"/>
+          </a:fontRef>
+        </p:style>
+        <p:txBody>
+          <a:bodyPr rtlCol="0" anchor="ctr"/>
+          <a:lstStyle/>
+          <a:p>
+            <a:pPr algn="ctr"/>
+            <a:endParaRPr lang="en-GB" sz="1200" dirty="0">
+              <a:latin typeface="CMU Serif Roman" panose="02000603000000000000" pitchFamily="2" charset="0"/>
+              <a:ea typeface="CMU Serif Roman" panose="02000603000000000000" pitchFamily="2" charset="0"/>
+              <a:cs typeface="CMU Serif Roman" panose="02000603000000000000" pitchFamily="2" charset="0"/>
+            </a:endParaRPr>
+          </a:p>
+        </p:txBody>
+      </p:sp>
+      <p:sp>
+        <p:nvSpPr>
+          <p:cNvPr id="21" name="Rettangolo 20">
+            <a:extLst>
+              <a:ext uri="{FF2B5EF4-FFF2-40B4-BE49-F238E27FC236}">
+                <a16:creationId xmlns:a16="http://schemas.microsoft.com/office/drawing/2014/main" id="{6D9B299F-7D51-7097-3DA7-6D3050C83CFD}"/>
+              </a:ext>
+            </a:extLst>
+          </p:cNvPr>
+          <p:cNvSpPr/>
+          <p:nvPr/>
+        </p:nvSpPr>
+        <p:spPr>
+          <a:xfrm>
+            <a:off x="3264956" y="4538566"/>
+            <a:ext cx="289932" cy="412595"/>
+          </a:xfrm>
+          <a:prstGeom prst="rect">
+            <a:avLst/>
+          </a:prstGeom>
+          <a:pattFill prst="pct40">
+            <a:fgClr>
+              <a:srgbClr val="FF0000"/>
+            </a:fgClr>
+            <a:bgClr>
+              <a:schemeClr val="bg1"/>
+            </a:bgClr>
+          </a:pattFill>
+          <a:ln>
+            <a:solidFill>
+              <a:srgbClr val="FF0000"/>
+            </a:solidFill>
+          </a:ln>
+        </p:spPr>
+        <p:style>
+          <a:lnRef idx="2">
+            <a:schemeClr val="accent1">
+              <a:shade val="50000"/>
+            </a:schemeClr>
+          </a:lnRef>
+          <a:fillRef idx="1">
+            <a:schemeClr val="accent1"/>
+          </a:fillRef>
+          <a:effectRef idx="0">
+            <a:schemeClr val="accent1"/>
+          </a:effectRef>
+          <a:fontRef idx="minor">
+            <a:schemeClr val="lt1"/>
+          </a:fontRef>
+        </p:style>
+        <p:txBody>
+          <a:bodyPr rtlCol="0" anchor="ctr"/>
+          <a:lstStyle/>
+          <a:p>
+            <a:pPr algn="ctr"/>
+            <a:endParaRPr lang="en-GB" sz="1200" dirty="0">
+              <a:latin typeface="CMU Serif Roman" panose="02000603000000000000" pitchFamily="2" charset="0"/>
+              <a:ea typeface="CMU Serif Roman" panose="02000603000000000000" pitchFamily="2" charset="0"/>
+              <a:cs typeface="CMU Serif Roman" panose="02000603000000000000" pitchFamily="2" charset="0"/>
+            </a:endParaRPr>
+          </a:p>
+        </p:txBody>
+      </p:sp>
+      <p:sp>
+        <p:nvSpPr>
+          <p:cNvPr id="22" name="CasellaDiTesto 21">
+            <a:extLst>
+              <a:ext uri="{FF2B5EF4-FFF2-40B4-BE49-F238E27FC236}">
+                <a16:creationId xmlns:a16="http://schemas.microsoft.com/office/drawing/2014/main" id="{422F9008-C556-0E22-4429-E92A8E95BDC3}"/>
+              </a:ext>
+            </a:extLst>
+          </p:cNvPr>
+          <p:cNvSpPr txBox="1"/>
+          <p:nvPr/>
+        </p:nvSpPr>
+        <p:spPr>
+          <a:xfrm>
+            <a:off x="3677346" y="4703007"/>
+            <a:ext cx="377026" cy="369332"/>
+          </a:xfrm>
+          <a:prstGeom prst="rect">
+            <a:avLst/>
+          </a:prstGeom>
+          <a:noFill/>
+        </p:spPr>
+        <p:txBody>
+          <a:bodyPr wrap="none" rtlCol="0">
+            <a:spAutoFit/>
+          </a:bodyPr>
+          <a:lstStyle/>
+          <a:p>
+            <a:r>
+              <a:rPr lang="en-GB" dirty="0">
+                <a:latin typeface="CMU Serif Roman" panose="02000603000000000000" pitchFamily="2" charset="0"/>
+                <a:ea typeface="CMU Serif Roman" panose="02000603000000000000" pitchFamily="2" charset="0"/>
+                <a:cs typeface="CMU Serif Roman" panose="02000603000000000000" pitchFamily="2" charset="0"/>
+              </a:rPr>
+              <a:t>…</a:t>
+            </a:r>
+          </a:p>
+        </p:txBody>
+      </p:sp>
+      <p:sp>
+        <p:nvSpPr>
+          <p:cNvPr id="23" name="Rettangolo 22">
+            <a:extLst>
+              <a:ext uri="{FF2B5EF4-FFF2-40B4-BE49-F238E27FC236}">
+                <a16:creationId xmlns:a16="http://schemas.microsoft.com/office/drawing/2014/main" id="{73F5638C-675F-2E89-21A6-3FBD9EF5E491}"/>
+              </a:ext>
+            </a:extLst>
+          </p:cNvPr>
+          <p:cNvSpPr/>
+          <p:nvPr/>
+        </p:nvSpPr>
+        <p:spPr>
+          <a:xfrm>
+            <a:off x="4176896" y="4543092"/>
+            <a:ext cx="289932" cy="412595"/>
+          </a:xfrm>
+          <a:prstGeom prst="rect">
+            <a:avLst/>
+          </a:prstGeom>
+          <a:pattFill prst="pct40">
+            <a:fgClr>
+              <a:srgbClr val="FF0000"/>
+            </a:fgClr>
+            <a:bgClr>
+              <a:schemeClr val="bg1"/>
+            </a:bgClr>
+          </a:pattFill>
+          <a:ln>
+            <a:solidFill>
+              <a:srgbClr val="FF0000"/>
+            </a:solidFill>
+          </a:ln>
+        </p:spPr>
+        <p:style>
+          <a:lnRef idx="2">
+            <a:schemeClr val="accent1">
+              <a:shade val="50000"/>
+            </a:schemeClr>
+          </a:lnRef>
+          <a:fillRef idx="1">
+            <a:schemeClr val="accent1"/>
+          </a:fillRef>
+          <a:effectRef idx="0">
+            <a:schemeClr val="accent1"/>
+          </a:effectRef>
+          <a:fontRef idx="minor">
+            <a:schemeClr val="lt1"/>
+          </a:fontRef>
+        </p:style>
+        <p:txBody>
+          <a:bodyPr rtlCol="0" anchor="ctr"/>
+          <a:lstStyle/>
+          <a:p>
+            <a:pPr algn="ctr"/>
+            <a:endParaRPr lang="en-GB" sz="1200" dirty="0">
+              <a:latin typeface="CMU Serif Roman" panose="02000603000000000000" pitchFamily="2" charset="0"/>
+              <a:ea typeface="CMU Serif Roman" panose="02000603000000000000" pitchFamily="2" charset="0"/>
+              <a:cs typeface="CMU Serif Roman" panose="02000603000000000000" pitchFamily="2" charset="0"/>
+            </a:endParaRPr>
+          </a:p>
+        </p:txBody>
+      </p:sp>
+      <p:sp>
+        <p:nvSpPr>
+          <p:cNvPr id="24" name="Rettangolo 23">
+            <a:extLst>
+              <a:ext uri="{FF2B5EF4-FFF2-40B4-BE49-F238E27FC236}">
+                <a16:creationId xmlns:a16="http://schemas.microsoft.com/office/drawing/2014/main" id="{4328BBC2-93DC-427B-D661-1122C7CE437A}"/>
+              </a:ext>
+            </a:extLst>
+          </p:cNvPr>
+          <p:cNvSpPr/>
+          <p:nvPr/>
+        </p:nvSpPr>
+        <p:spPr>
+          <a:xfrm>
+            <a:off x="4679368" y="4543092"/>
             <a:ext cx="289932" cy="412595"/>
           </a:xfrm>
           <a:prstGeom prst="rect">
@@ -9598,10 +11147,10 @@
       </p:sp>
       <p:sp>
         <p:nvSpPr>
-          <p:cNvPr id="36" name="Rettangolo 35">
-            <a:extLst>
-              <a:ext uri="{FF2B5EF4-FFF2-40B4-BE49-F238E27FC236}">
-                <a16:creationId xmlns:a16="http://schemas.microsoft.com/office/drawing/2014/main" id="{D72F764C-288F-6DFA-C727-A1951BA24F08}"/>
+          <p:cNvPr id="25" name="Rettangolo 24">
+            <a:extLst>
+              <a:ext uri="{FF2B5EF4-FFF2-40B4-BE49-F238E27FC236}">
+                <a16:creationId xmlns:a16="http://schemas.microsoft.com/office/drawing/2014/main" id="{48BA98DC-D260-48D4-ACA5-C104C6F0F791}"/>
               </a:ext>
             </a:extLst>
           </p:cNvPr>
@@ -9610,7 +11159,7 @@
         </p:nvSpPr>
         <p:spPr>
           <a:xfrm>
-            <a:off x="4889518" y="496922"/>
+            <a:off x="5189120" y="4543092"/>
             <a:ext cx="289932" cy="412595"/>
           </a:xfrm>
           <a:prstGeom prst="rect">
@@ -9661,10 +11210,49 @@
       </p:sp>
       <p:sp>
         <p:nvSpPr>
-          <p:cNvPr id="37" name="Rettangolo 36">
-            <a:extLst>
-              <a:ext uri="{FF2B5EF4-FFF2-40B4-BE49-F238E27FC236}">
-                <a16:creationId xmlns:a16="http://schemas.microsoft.com/office/drawing/2014/main" id="{44A85217-A72E-BF80-04BD-5C23F5E1AD20}"/>
+          <p:cNvPr id="27" name="CasellaDiTesto 26">
+            <a:extLst>
+              <a:ext uri="{FF2B5EF4-FFF2-40B4-BE49-F238E27FC236}">
+                <a16:creationId xmlns:a16="http://schemas.microsoft.com/office/drawing/2014/main" id="{1B5F5CCB-3F47-AEF7-E5F9-C098C2D3268B}"/>
+              </a:ext>
+            </a:extLst>
+          </p:cNvPr>
+          <p:cNvSpPr txBox="1"/>
+          <p:nvPr/>
+        </p:nvSpPr>
+        <p:spPr>
+          <a:xfrm>
+            <a:off x="5635919" y="4703007"/>
+            <a:ext cx="377026" cy="369332"/>
+          </a:xfrm>
+          <a:prstGeom prst="rect">
+            <a:avLst/>
+          </a:prstGeom>
+          <a:noFill/>
+        </p:spPr>
+        <p:txBody>
+          <a:bodyPr wrap="none" rtlCol="0">
+            <a:spAutoFit/>
+          </a:bodyPr>
+          <a:lstStyle/>
+          <a:p>
+            <a:r>
+              <a:rPr lang="en-GB" dirty="0">
+                <a:latin typeface="CMU Serif Roman" panose="02000603000000000000" pitchFamily="2" charset="0"/>
+                <a:ea typeface="CMU Serif Roman" panose="02000603000000000000" pitchFamily="2" charset="0"/>
+                <a:cs typeface="CMU Serif Roman" panose="02000603000000000000" pitchFamily="2" charset="0"/>
+              </a:rPr>
+              <a:t>…</a:t>
+            </a:r>
+          </a:p>
+        </p:txBody>
+      </p:sp>
+      <p:sp>
+        <p:nvSpPr>
+          <p:cNvPr id="28" name="Rettangolo 27">
+            <a:extLst>
+              <a:ext uri="{FF2B5EF4-FFF2-40B4-BE49-F238E27FC236}">
+                <a16:creationId xmlns:a16="http://schemas.microsoft.com/office/drawing/2014/main" id="{322334DF-A97A-0E8F-2225-F10FCDDCB06A}"/>
               </a:ext>
             </a:extLst>
           </p:cNvPr>
@@ -9673,7 +11261,7 @@
         </p:nvSpPr>
         <p:spPr>
           <a:xfrm>
-            <a:off x="4572821" y="986510"/>
+            <a:off x="6153421" y="4543092"/>
             <a:ext cx="289932" cy="412595"/>
           </a:xfrm>
           <a:prstGeom prst="rect">
@@ -9724,1595 +11312,6 @@
       </p:sp>
       <p:sp>
         <p:nvSpPr>
-          <p:cNvPr id="38" name="CasellaDiTesto 37">
-            <a:extLst>
-              <a:ext uri="{FF2B5EF4-FFF2-40B4-BE49-F238E27FC236}">
-                <a16:creationId xmlns:a16="http://schemas.microsoft.com/office/drawing/2014/main" id="{F5651320-6C03-F7D1-7AB6-C3CEDC250C8A}"/>
-              </a:ext>
-            </a:extLst>
-          </p:cNvPr>
-          <p:cNvSpPr txBox="1"/>
-          <p:nvPr/>
-        </p:nvSpPr>
-        <p:spPr>
-          <a:xfrm>
-            <a:off x="3784679" y="1652431"/>
-            <a:ext cx="1866217" cy="461665"/>
-          </a:xfrm>
-          <a:prstGeom prst="rect">
-            <a:avLst/>
-          </a:prstGeom>
-          <a:noFill/>
-        </p:spPr>
-        <p:txBody>
-          <a:bodyPr wrap="none" rtlCol="0">
-            <a:spAutoFit/>
-          </a:bodyPr>
-          <a:lstStyle/>
-          <a:p>
-            <a:pPr algn="ctr"/>
-            <a:r>
-              <a:rPr lang="en-GB" sz="1200" dirty="0">
-                <a:latin typeface="CMU Serif Roman" panose="02000603000000000000" pitchFamily="2" charset="0"/>
-                <a:ea typeface="CMU Serif Roman" panose="02000603000000000000" pitchFamily="2" charset="0"/>
-                <a:cs typeface="CMU Serif Roman" panose="02000603000000000000" pitchFamily="2" charset="0"/>
-              </a:rPr>
-              <a:t>Latest values of all </a:t>
-            </a:r>
-          </a:p>
-          <a:p>
-            <a:pPr algn="ctr"/>
-            <a:r>
-              <a:rPr lang="en-GB" sz="1200" dirty="0">
-                <a:latin typeface="CMU Serif Roman" panose="02000603000000000000" pitchFamily="2" charset="0"/>
-                <a:ea typeface="CMU Serif Roman" panose="02000603000000000000" pitchFamily="2" charset="0"/>
-                <a:cs typeface="CMU Serif Roman" panose="02000603000000000000" pitchFamily="2" charset="0"/>
-              </a:rPr>
-              <a:t>the instances of a service</a:t>
-            </a:r>
-          </a:p>
-        </p:txBody>
-      </p:sp>
-      <p:cxnSp>
-        <p:nvCxnSpPr>
-          <p:cNvPr id="39" name="Connettore 2 38">
-            <a:extLst>
-              <a:ext uri="{FF2B5EF4-FFF2-40B4-BE49-F238E27FC236}">
-                <a16:creationId xmlns:a16="http://schemas.microsoft.com/office/drawing/2014/main" id="{13C929AF-EA29-B6E8-6C07-FA81BD384DD4}"/>
-              </a:ext>
-            </a:extLst>
-          </p:cNvPr>
-          <p:cNvCxnSpPr>
-            <a:cxnSpLocks/>
-          </p:cNvCxnSpPr>
-          <p:nvPr/>
-        </p:nvCxnSpPr>
-        <p:spPr>
-          <a:xfrm>
-            <a:off x="5694740" y="885455"/>
-            <a:ext cx="2328126" cy="0"/>
-          </a:xfrm>
-          <a:prstGeom prst="straightConnector1">
-            <a:avLst/>
-          </a:prstGeom>
-          <a:ln>
-            <a:tailEnd type="triangle"/>
-          </a:ln>
-        </p:spPr>
-        <p:style>
-          <a:lnRef idx="1">
-            <a:schemeClr val="accent1"/>
-          </a:lnRef>
-          <a:fillRef idx="0">
-            <a:schemeClr val="accent1"/>
-          </a:fillRef>
-          <a:effectRef idx="0">
-            <a:schemeClr val="accent1"/>
-          </a:effectRef>
-          <a:fontRef idx="minor">
-            <a:schemeClr val="tx1"/>
-          </a:fontRef>
-        </p:style>
-      </p:cxnSp>
-      <p:sp>
-        <p:nvSpPr>
-          <p:cNvPr id="64" name="Rettangolo 63">
-            <a:extLst>
-              <a:ext uri="{FF2B5EF4-FFF2-40B4-BE49-F238E27FC236}">
-                <a16:creationId xmlns:a16="http://schemas.microsoft.com/office/drawing/2014/main" id="{10D73B22-69FA-ABE5-2613-50A6D11EDA7F}"/>
-              </a:ext>
-            </a:extLst>
-          </p:cNvPr>
-          <p:cNvSpPr/>
-          <p:nvPr/>
-        </p:nvSpPr>
-        <p:spPr>
-          <a:xfrm>
-            <a:off x="8382884" y="682300"/>
-            <a:ext cx="289932" cy="412595"/>
-          </a:xfrm>
-          <a:prstGeom prst="rect">
-            <a:avLst/>
-          </a:prstGeom>
-          <a:pattFill prst="pct40">
-            <a:fgClr>
-              <a:srgbClr val="00B050"/>
-            </a:fgClr>
-            <a:bgClr>
-              <a:schemeClr val="bg1"/>
-            </a:bgClr>
-          </a:pattFill>
-          <a:ln>
-            <a:solidFill>
-              <a:srgbClr val="00B050"/>
-            </a:solidFill>
-          </a:ln>
-        </p:spPr>
-        <p:style>
-          <a:lnRef idx="2">
-            <a:schemeClr val="accent1">
-              <a:shade val="50000"/>
-            </a:schemeClr>
-          </a:lnRef>
-          <a:fillRef idx="1">
-            <a:schemeClr val="accent1"/>
-          </a:fillRef>
-          <a:effectRef idx="0">
-            <a:schemeClr val="accent1"/>
-          </a:effectRef>
-          <a:fontRef idx="minor">
-            <a:schemeClr val="lt1"/>
-          </a:fontRef>
-        </p:style>
-        <p:txBody>
-          <a:bodyPr rtlCol="0" anchor="ctr"/>
-          <a:lstStyle/>
-          <a:p>
-            <a:pPr algn="ctr"/>
-            <a:endParaRPr lang="en-GB" sz="1200" dirty="0">
-              <a:latin typeface="CMU Serif Roman" panose="02000603000000000000" pitchFamily="2" charset="0"/>
-              <a:ea typeface="CMU Serif Roman" panose="02000603000000000000" pitchFamily="2" charset="0"/>
-              <a:cs typeface="CMU Serif Roman" panose="02000603000000000000" pitchFamily="2" charset="0"/>
-            </a:endParaRPr>
-          </a:p>
-        </p:txBody>
-      </p:sp>
-      <p:sp>
-        <p:nvSpPr>
-          <p:cNvPr id="65" name="CasellaDiTesto 64">
-            <a:extLst>
-              <a:ext uri="{FF2B5EF4-FFF2-40B4-BE49-F238E27FC236}">
-                <a16:creationId xmlns:a16="http://schemas.microsoft.com/office/drawing/2014/main" id="{46DCE52E-2D76-07DC-EF7A-F6360D1AF781}"/>
-              </a:ext>
-            </a:extLst>
-          </p:cNvPr>
-          <p:cNvSpPr txBox="1"/>
-          <p:nvPr/>
-        </p:nvSpPr>
-        <p:spPr>
-          <a:xfrm>
-            <a:off x="7741275" y="1153457"/>
-            <a:ext cx="1609736" cy="461665"/>
-          </a:xfrm>
-          <a:prstGeom prst="rect">
-            <a:avLst/>
-          </a:prstGeom>
-          <a:noFill/>
-        </p:spPr>
-        <p:txBody>
-          <a:bodyPr wrap="none" rtlCol="0">
-            <a:spAutoFit/>
-          </a:bodyPr>
-          <a:lstStyle/>
-          <a:p>
-            <a:pPr algn="ctr"/>
-            <a:r>
-              <a:rPr lang="en-GB" sz="1200" dirty="0">
-                <a:latin typeface="CMU Serif Roman" panose="02000603000000000000" pitchFamily="2" charset="0"/>
-                <a:ea typeface="CMU Serif Roman" panose="02000603000000000000" pitchFamily="2" charset="0"/>
-                <a:cs typeface="CMU Serif Roman" panose="02000603000000000000" pitchFamily="2" charset="0"/>
-              </a:rPr>
-              <a:t>new QoS latest value</a:t>
-            </a:r>
-          </a:p>
-          <a:p>
-            <a:pPr algn="ctr"/>
-            <a:r>
-              <a:rPr lang="en-GB" sz="1200" dirty="0">
-                <a:latin typeface="CMU Serif Roman" panose="02000603000000000000" pitchFamily="2" charset="0"/>
-                <a:ea typeface="CMU Serif Roman" panose="02000603000000000000" pitchFamily="2" charset="0"/>
-                <a:cs typeface="CMU Serif Roman" panose="02000603000000000000" pitchFamily="2" charset="0"/>
-              </a:rPr>
-              <a:t>of the service</a:t>
-            </a:r>
-          </a:p>
-        </p:txBody>
-      </p:sp>
-      <p:sp>
-        <p:nvSpPr>
-          <p:cNvPr id="86" name="Rettangolo 85">
-            <a:extLst>
-              <a:ext uri="{FF2B5EF4-FFF2-40B4-BE49-F238E27FC236}">
-                <a16:creationId xmlns:a16="http://schemas.microsoft.com/office/drawing/2014/main" id="{535286B7-E41B-E572-52F2-67A5C76356A8}"/>
-              </a:ext>
-            </a:extLst>
-          </p:cNvPr>
-          <p:cNvSpPr/>
-          <p:nvPr/>
-        </p:nvSpPr>
-        <p:spPr>
-          <a:xfrm>
-            <a:off x="4679368" y="3476270"/>
-            <a:ext cx="289932" cy="412595"/>
-          </a:xfrm>
-          <a:prstGeom prst="rect">
-            <a:avLst/>
-          </a:prstGeom>
-          <a:pattFill prst="pct40">
-            <a:fgClr>
-              <a:srgbClr val="FF0000"/>
-            </a:fgClr>
-            <a:bgClr>
-              <a:schemeClr val="bg1"/>
-            </a:bgClr>
-          </a:pattFill>
-          <a:ln>
-            <a:solidFill>
-              <a:srgbClr val="FF0000"/>
-            </a:solidFill>
-          </a:ln>
-        </p:spPr>
-        <p:style>
-          <a:lnRef idx="2">
-            <a:schemeClr val="accent1">
-              <a:shade val="50000"/>
-            </a:schemeClr>
-          </a:lnRef>
-          <a:fillRef idx="1">
-            <a:schemeClr val="accent1"/>
-          </a:fillRef>
-          <a:effectRef idx="0">
-            <a:schemeClr val="accent1"/>
-          </a:effectRef>
-          <a:fontRef idx="minor">
-            <a:schemeClr val="lt1"/>
-          </a:fontRef>
-        </p:style>
-        <p:txBody>
-          <a:bodyPr rtlCol="0" anchor="ctr"/>
-          <a:lstStyle/>
-          <a:p>
-            <a:pPr algn="ctr"/>
-            <a:endParaRPr lang="en-GB" sz="1200" dirty="0">
-              <a:latin typeface="CMU Serif Roman" panose="02000603000000000000" pitchFamily="2" charset="0"/>
-              <a:ea typeface="CMU Serif Roman" panose="02000603000000000000" pitchFamily="2" charset="0"/>
-              <a:cs typeface="CMU Serif Roman" panose="02000603000000000000" pitchFamily="2" charset="0"/>
-            </a:endParaRPr>
-          </a:p>
-        </p:txBody>
-      </p:sp>
-      <p:sp>
-        <p:nvSpPr>
-          <p:cNvPr id="87" name="Rettangolo 86">
-            <a:extLst>
-              <a:ext uri="{FF2B5EF4-FFF2-40B4-BE49-F238E27FC236}">
-                <a16:creationId xmlns:a16="http://schemas.microsoft.com/office/drawing/2014/main" id="{03EB2BCD-0ECF-D653-E549-F9E7CB777859}"/>
-              </a:ext>
-            </a:extLst>
-          </p:cNvPr>
-          <p:cNvSpPr/>
-          <p:nvPr/>
-        </p:nvSpPr>
-        <p:spPr>
-          <a:xfrm>
-            <a:off x="5189120" y="3476270"/>
-            <a:ext cx="289932" cy="412595"/>
-          </a:xfrm>
-          <a:prstGeom prst="rect">
-            <a:avLst/>
-          </a:prstGeom>
-          <a:pattFill prst="pct40">
-            <a:fgClr>
-              <a:srgbClr val="FF0000"/>
-            </a:fgClr>
-            <a:bgClr>
-              <a:schemeClr val="bg1"/>
-            </a:bgClr>
-          </a:pattFill>
-          <a:ln>
-            <a:solidFill>
-              <a:srgbClr val="FF0000"/>
-            </a:solidFill>
-          </a:ln>
-        </p:spPr>
-        <p:style>
-          <a:lnRef idx="2">
-            <a:schemeClr val="accent1">
-              <a:shade val="50000"/>
-            </a:schemeClr>
-          </a:lnRef>
-          <a:fillRef idx="1">
-            <a:schemeClr val="accent1"/>
-          </a:fillRef>
-          <a:effectRef idx="0">
-            <a:schemeClr val="accent1"/>
-          </a:effectRef>
-          <a:fontRef idx="minor">
-            <a:schemeClr val="lt1"/>
-          </a:fontRef>
-        </p:style>
-        <p:txBody>
-          <a:bodyPr rtlCol="0" anchor="ctr"/>
-          <a:lstStyle/>
-          <a:p>
-            <a:pPr algn="ctr"/>
-            <a:endParaRPr lang="en-GB" sz="1200" dirty="0">
-              <a:latin typeface="CMU Serif Roman" panose="02000603000000000000" pitchFamily="2" charset="0"/>
-              <a:ea typeface="CMU Serif Roman" panose="02000603000000000000" pitchFamily="2" charset="0"/>
-              <a:cs typeface="CMU Serif Roman" panose="02000603000000000000" pitchFamily="2" charset="0"/>
-            </a:endParaRPr>
-          </a:p>
-        </p:txBody>
-      </p:sp>
-      <p:sp>
-        <p:nvSpPr>
-          <p:cNvPr id="88" name="CasellaDiTesto 87">
-            <a:extLst>
-              <a:ext uri="{FF2B5EF4-FFF2-40B4-BE49-F238E27FC236}">
-                <a16:creationId xmlns:a16="http://schemas.microsoft.com/office/drawing/2014/main" id="{6C3509C8-C573-DDFD-07C8-612FFE1A1135}"/>
-              </a:ext>
-            </a:extLst>
-          </p:cNvPr>
-          <p:cNvSpPr txBox="1"/>
-          <p:nvPr/>
-        </p:nvSpPr>
-        <p:spPr>
-          <a:xfrm>
-            <a:off x="5635919" y="3636185"/>
-            <a:ext cx="377026" cy="369332"/>
-          </a:xfrm>
-          <a:prstGeom prst="rect">
-            <a:avLst/>
-          </a:prstGeom>
-          <a:noFill/>
-        </p:spPr>
-        <p:txBody>
-          <a:bodyPr wrap="none" rtlCol="0">
-            <a:spAutoFit/>
-          </a:bodyPr>
-          <a:lstStyle/>
-          <a:p>
-            <a:r>
-              <a:rPr lang="en-GB" dirty="0">
-                <a:latin typeface="CMU Serif Roman" panose="02000603000000000000" pitchFamily="2" charset="0"/>
-                <a:ea typeface="CMU Serif Roman" panose="02000603000000000000" pitchFamily="2" charset="0"/>
-                <a:cs typeface="CMU Serif Roman" panose="02000603000000000000" pitchFamily="2" charset="0"/>
-              </a:rPr>
-              <a:t>…</a:t>
-            </a:r>
-          </a:p>
-        </p:txBody>
-      </p:sp>
-      <p:sp>
-        <p:nvSpPr>
-          <p:cNvPr id="89" name="Rettangolo 88">
-            <a:extLst>
-              <a:ext uri="{FF2B5EF4-FFF2-40B4-BE49-F238E27FC236}">
-                <a16:creationId xmlns:a16="http://schemas.microsoft.com/office/drawing/2014/main" id="{4CB2A7DB-F467-55F6-0971-732643CADE87}"/>
-              </a:ext>
-            </a:extLst>
-          </p:cNvPr>
-          <p:cNvSpPr/>
-          <p:nvPr/>
-        </p:nvSpPr>
-        <p:spPr>
-          <a:xfrm>
-            <a:off x="6153421" y="3476270"/>
-            <a:ext cx="289932" cy="412595"/>
-          </a:xfrm>
-          <a:prstGeom prst="rect">
-            <a:avLst/>
-          </a:prstGeom>
-          <a:pattFill prst="pct40">
-            <a:fgClr>
-              <a:srgbClr val="FF0000"/>
-            </a:fgClr>
-            <a:bgClr>
-              <a:schemeClr val="bg1"/>
-            </a:bgClr>
-          </a:pattFill>
-          <a:ln>
-            <a:solidFill>
-              <a:srgbClr val="FF0000"/>
-            </a:solidFill>
-          </a:ln>
-        </p:spPr>
-        <p:style>
-          <a:lnRef idx="2">
-            <a:schemeClr val="accent1">
-              <a:shade val="50000"/>
-            </a:schemeClr>
-          </a:lnRef>
-          <a:fillRef idx="1">
-            <a:schemeClr val="accent1"/>
-          </a:fillRef>
-          <a:effectRef idx="0">
-            <a:schemeClr val="accent1"/>
-          </a:effectRef>
-          <a:fontRef idx="minor">
-            <a:schemeClr val="lt1"/>
-          </a:fontRef>
-        </p:style>
-        <p:txBody>
-          <a:bodyPr rtlCol="0" anchor="ctr"/>
-          <a:lstStyle/>
-          <a:p>
-            <a:pPr algn="ctr"/>
-            <a:endParaRPr lang="en-GB" sz="1200" dirty="0">
-              <a:latin typeface="CMU Serif Roman" panose="02000603000000000000" pitchFamily="2" charset="0"/>
-              <a:ea typeface="CMU Serif Roman" panose="02000603000000000000" pitchFamily="2" charset="0"/>
-              <a:cs typeface="CMU Serif Roman" panose="02000603000000000000" pitchFamily="2" charset="0"/>
-            </a:endParaRPr>
-          </a:p>
-        </p:txBody>
-      </p:sp>
-      <p:sp>
-        <p:nvSpPr>
-          <p:cNvPr id="90" name="Rettangolo 89">
-            <a:extLst>
-              <a:ext uri="{FF2B5EF4-FFF2-40B4-BE49-F238E27FC236}">
-                <a16:creationId xmlns:a16="http://schemas.microsoft.com/office/drawing/2014/main" id="{8F5D39CA-6351-CC93-E09F-2B4064A4D7E6}"/>
-              </a:ext>
-            </a:extLst>
-          </p:cNvPr>
-          <p:cNvSpPr/>
-          <p:nvPr/>
-        </p:nvSpPr>
-        <p:spPr>
-          <a:xfrm>
-            <a:off x="3264956" y="3476270"/>
-            <a:ext cx="289932" cy="412595"/>
-          </a:xfrm>
-          <a:prstGeom prst="rect">
-            <a:avLst/>
-          </a:prstGeom>
-          <a:pattFill prst="pct40">
-            <a:fgClr>
-              <a:srgbClr val="FF0000"/>
-            </a:fgClr>
-            <a:bgClr>
-              <a:schemeClr val="bg1"/>
-            </a:bgClr>
-          </a:pattFill>
-          <a:ln>
-            <a:solidFill>
-              <a:srgbClr val="FF0000"/>
-            </a:solidFill>
-          </a:ln>
-        </p:spPr>
-        <p:style>
-          <a:lnRef idx="2">
-            <a:schemeClr val="accent1">
-              <a:shade val="50000"/>
-            </a:schemeClr>
-          </a:lnRef>
-          <a:fillRef idx="1">
-            <a:schemeClr val="accent1"/>
-          </a:fillRef>
-          <a:effectRef idx="0">
-            <a:schemeClr val="accent1"/>
-          </a:effectRef>
-          <a:fontRef idx="minor">
-            <a:schemeClr val="lt1"/>
-          </a:fontRef>
-        </p:style>
-        <p:txBody>
-          <a:bodyPr rtlCol="0" anchor="ctr"/>
-          <a:lstStyle/>
-          <a:p>
-            <a:pPr algn="ctr"/>
-            <a:endParaRPr lang="en-GB" sz="1200" dirty="0">
-              <a:latin typeface="CMU Serif Roman" panose="02000603000000000000" pitchFamily="2" charset="0"/>
-              <a:ea typeface="CMU Serif Roman" panose="02000603000000000000" pitchFamily="2" charset="0"/>
-              <a:cs typeface="CMU Serif Roman" panose="02000603000000000000" pitchFamily="2" charset="0"/>
-            </a:endParaRPr>
-          </a:p>
-        </p:txBody>
-      </p:sp>
-      <p:sp>
-        <p:nvSpPr>
-          <p:cNvPr id="92" name="CasellaDiTesto 91">
-            <a:extLst>
-              <a:ext uri="{FF2B5EF4-FFF2-40B4-BE49-F238E27FC236}">
-                <a16:creationId xmlns:a16="http://schemas.microsoft.com/office/drawing/2014/main" id="{D2265E0A-0D79-0082-89A6-3C5D10E0889E}"/>
-              </a:ext>
-            </a:extLst>
-          </p:cNvPr>
-          <p:cNvSpPr txBox="1"/>
-          <p:nvPr/>
-        </p:nvSpPr>
-        <p:spPr>
-          <a:xfrm>
-            <a:off x="3677346" y="3636185"/>
-            <a:ext cx="377026" cy="369332"/>
-          </a:xfrm>
-          <a:prstGeom prst="rect">
-            <a:avLst/>
-          </a:prstGeom>
-          <a:noFill/>
-        </p:spPr>
-        <p:txBody>
-          <a:bodyPr wrap="none" rtlCol="0">
-            <a:spAutoFit/>
-          </a:bodyPr>
-          <a:lstStyle/>
-          <a:p>
-            <a:r>
-              <a:rPr lang="en-GB" dirty="0">
-                <a:latin typeface="CMU Serif Roman" panose="02000603000000000000" pitchFamily="2" charset="0"/>
-                <a:ea typeface="CMU Serif Roman" panose="02000603000000000000" pitchFamily="2" charset="0"/>
-                <a:cs typeface="CMU Serif Roman" panose="02000603000000000000" pitchFamily="2" charset="0"/>
-              </a:rPr>
-              <a:t>…</a:t>
-            </a:r>
-          </a:p>
-        </p:txBody>
-      </p:sp>
-      <p:sp>
-        <p:nvSpPr>
-          <p:cNvPr id="93" name="Rettangolo 92">
-            <a:extLst>
-              <a:ext uri="{FF2B5EF4-FFF2-40B4-BE49-F238E27FC236}">
-                <a16:creationId xmlns:a16="http://schemas.microsoft.com/office/drawing/2014/main" id="{790DC27D-71AC-4C28-E72B-A7B794063AF9}"/>
-              </a:ext>
-            </a:extLst>
-          </p:cNvPr>
-          <p:cNvSpPr/>
-          <p:nvPr/>
-        </p:nvSpPr>
-        <p:spPr>
-          <a:xfrm>
-            <a:off x="4176896" y="3476270"/>
-            <a:ext cx="289932" cy="412595"/>
-          </a:xfrm>
-          <a:prstGeom prst="rect">
-            <a:avLst/>
-          </a:prstGeom>
-          <a:pattFill prst="pct40">
-            <a:fgClr>
-              <a:srgbClr val="FF0000"/>
-            </a:fgClr>
-            <a:bgClr>
-              <a:schemeClr val="bg1"/>
-            </a:bgClr>
-          </a:pattFill>
-          <a:ln>
-            <a:solidFill>
-              <a:srgbClr val="FF0000"/>
-            </a:solidFill>
-          </a:ln>
-        </p:spPr>
-        <p:style>
-          <a:lnRef idx="2">
-            <a:schemeClr val="accent1">
-              <a:shade val="50000"/>
-            </a:schemeClr>
-          </a:lnRef>
-          <a:fillRef idx="1">
-            <a:schemeClr val="accent1"/>
-          </a:fillRef>
-          <a:effectRef idx="0">
-            <a:schemeClr val="accent1"/>
-          </a:effectRef>
-          <a:fontRef idx="minor">
-            <a:schemeClr val="lt1"/>
-          </a:fontRef>
-        </p:style>
-        <p:txBody>
-          <a:bodyPr rtlCol="0" anchor="ctr"/>
-          <a:lstStyle/>
-          <a:p>
-            <a:pPr algn="ctr"/>
-            <a:endParaRPr lang="en-GB" sz="1200" dirty="0">
-              <a:latin typeface="CMU Serif Roman" panose="02000603000000000000" pitchFamily="2" charset="0"/>
-              <a:ea typeface="CMU Serif Roman" panose="02000603000000000000" pitchFamily="2" charset="0"/>
-              <a:cs typeface="CMU Serif Roman" panose="02000603000000000000" pitchFamily="2" charset="0"/>
-            </a:endParaRPr>
-          </a:p>
-        </p:txBody>
-      </p:sp>
-      <p:sp>
-        <p:nvSpPr>
-          <p:cNvPr id="95" name="CasellaDiTesto 94">
-            <a:extLst>
-              <a:ext uri="{FF2B5EF4-FFF2-40B4-BE49-F238E27FC236}">
-                <a16:creationId xmlns:a16="http://schemas.microsoft.com/office/drawing/2014/main" id="{06DA23A0-A721-D6E2-C982-8AAF3D539D47}"/>
-              </a:ext>
-            </a:extLst>
-          </p:cNvPr>
-          <p:cNvSpPr txBox="1"/>
-          <p:nvPr/>
-        </p:nvSpPr>
-        <p:spPr>
-          <a:xfrm>
-            <a:off x="5676951" y="608456"/>
-            <a:ext cx="2311851" cy="276999"/>
-          </a:xfrm>
-          <a:prstGeom prst="rect">
-            <a:avLst/>
-          </a:prstGeom>
-          <a:noFill/>
-        </p:spPr>
-        <p:txBody>
-          <a:bodyPr wrap="none" rtlCol="0">
-            <a:spAutoFit/>
-          </a:bodyPr>
-          <a:lstStyle/>
-          <a:p>
-            <a:r>
-              <a:rPr lang="en-GB" sz="1200" dirty="0">
-                <a:latin typeface="CMU Serif Roman" panose="02000603000000000000" pitchFamily="2" charset="0"/>
-                <a:ea typeface="CMU Serif Roman" panose="02000603000000000000" pitchFamily="2" charset="0"/>
-                <a:cs typeface="CMU Serif Roman" panose="02000603000000000000" pitchFamily="2" charset="0"/>
-              </a:rPr>
-              <a:t>During each Analysis execution</a:t>
-            </a:r>
-          </a:p>
-        </p:txBody>
-      </p:sp>
-      <p:sp>
-        <p:nvSpPr>
-          <p:cNvPr id="10" name="CasellaDiTesto 9">
-            <a:extLst>
-              <a:ext uri="{FF2B5EF4-FFF2-40B4-BE49-F238E27FC236}">
-                <a16:creationId xmlns:a16="http://schemas.microsoft.com/office/drawing/2014/main" id="{AC9C5121-B7F9-A58F-3F26-8F0EDA4F3175}"/>
-              </a:ext>
-            </a:extLst>
-          </p:cNvPr>
-          <p:cNvSpPr txBox="1"/>
-          <p:nvPr/>
-        </p:nvSpPr>
-        <p:spPr>
-          <a:xfrm>
-            <a:off x="1100150" y="656741"/>
-            <a:ext cx="2565126" cy="461665"/>
-          </a:xfrm>
-          <a:prstGeom prst="rect">
-            <a:avLst/>
-          </a:prstGeom>
-          <a:noFill/>
-        </p:spPr>
-        <p:txBody>
-          <a:bodyPr wrap="none" rtlCol="0">
-            <a:spAutoFit/>
-          </a:bodyPr>
-          <a:lstStyle/>
-          <a:p>
-            <a:pPr algn="r"/>
-            <a:r>
-              <a:rPr lang="en-GB" sz="1200" noProof="1">
-                <a:latin typeface="CMU Serif Roman" panose="02000603000000000000" pitchFamily="2" charset="0"/>
-                <a:ea typeface="CMU Serif Roman" panose="02000603000000000000" pitchFamily="2" charset="0"/>
-                <a:cs typeface="CMU Serif Roman" panose="02000603000000000000" pitchFamily="2" charset="0"/>
-              </a:rPr>
-              <a:t>∀ service with at least one instance</a:t>
-            </a:r>
-          </a:p>
-          <a:p>
-            <a:pPr algn="r"/>
-            <a:r>
-              <a:rPr lang="en-GB" sz="1200" noProof="1">
-                <a:latin typeface="CMU Serif Roman" panose="02000603000000000000" pitchFamily="2" charset="0"/>
-                <a:ea typeface="CMU Serif Roman" panose="02000603000000000000" pitchFamily="2" charset="0"/>
-                <a:cs typeface="CMU Serif Roman" panose="02000603000000000000" pitchFamily="2" charset="0"/>
-              </a:rPr>
-              <a:t>with a new latest value</a:t>
-            </a:r>
-            <a:endParaRPr lang="en-GB" sz="1200" dirty="0">
-              <a:latin typeface="CMU Serif Roman" panose="02000603000000000000" pitchFamily="2" charset="0"/>
-              <a:ea typeface="CMU Serif Roman" panose="02000603000000000000" pitchFamily="2" charset="0"/>
-              <a:cs typeface="CMU Serif Roman" panose="02000603000000000000" pitchFamily="2" charset="0"/>
-            </a:endParaRPr>
-          </a:p>
-        </p:txBody>
-      </p:sp>
-      <p:sp>
-        <p:nvSpPr>
-          <p:cNvPr id="11" name="CasellaDiTesto 10">
-            <a:extLst>
-              <a:ext uri="{FF2B5EF4-FFF2-40B4-BE49-F238E27FC236}">
-                <a16:creationId xmlns:a16="http://schemas.microsoft.com/office/drawing/2014/main" id="{DE11A1A7-639A-9D21-048A-A92A1F17C430}"/>
-              </a:ext>
-            </a:extLst>
-          </p:cNvPr>
-          <p:cNvSpPr txBox="1"/>
-          <p:nvPr/>
-        </p:nvSpPr>
-        <p:spPr>
-          <a:xfrm>
-            <a:off x="1413097" y="2355285"/>
-            <a:ext cx="1683474" cy="461665"/>
-          </a:xfrm>
-          <a:prstGeom prst="rect">
-            <a:avLst/>
-          </a:prstGeom>
-          <a:noFill/>
-        </p:spPr>
-        <p:txBody>
-          <a:bodyPr wrap="none" rtlCol="0">
-            <a:spAutoFit/>
-          </a:bodyPr>
-          <a:lstStyle/>
-          <a:p>
-            <a:pPr algn="r"/>
-            <a:r>
-              <a:rPr lang="en-GB" sz="1200" noProof="1">
-                <a:latin typeface="CMU Serif Roman" panose="02000603000000000000" pitchFamily="2" charset="0"/>
-                <a:ea typeface="CMU Serif Roman" panose="02000603000000000000" pitchFamily="2" charset="0"/>
-                <a:cs typeface="CMU Serif Roman" panose="02000603000000000000" pitchFamily="2" charset="0"/>
-              </a:rPr>
-              <a:t>∀ service with at least</a:t>
-            </a:r>
-          </a:p>
-          <a:p>
-            <a:pPr algn="r"/>
-            <a:r>
-              <a:rPr lang="en-GB" sz="1200" noProof="1">
-                <a:latin typeface="CMU Concrete Roman" panose="02000603000000000000" pitchFamily="2" charset="0"/>
-                <a:ea typeface="CMU Concrete Roman" panose="02000603000000000000" pitchFamily="2" charset="0"/>
-                <a:cs typeface="CMU Concrete Roman" panose="02000603000000000000" pitchFamily="2" charset="0"/>
-              </a:rPr>
-              <a:t>k=AWS</a:t>
-            </a:r>
-            <a:r>
-              <a:rPr lang="en-GB" sz="1200" noProof="1">
-                <a:latin typeface="CMU Serif Roman" panose="02000603000000000000" pitchFamily="2" charset="0"/>
-                <a:ea typeface="CMU Serif Roman" panose="02000603000000000000" pitchFamily="2" charset="0"/>
-                <a:cs typeface="CMU Serif Roman" panose="02000603000000000000" pitchFamily="2" charset="0"/>
-              </a:rPr>
-              <a:t> valid values</a:t>
-            </a:r>
-            <a:endParaRPr lang="en-GB" sz="1200" dirty="0">
-              <a:latin typeface="CMU Serif Roman" panose="02000603000000000000" pitchFamily="2" charset="0"/>
-              <a:ea typeface="CMU Serif Roman" panose="02000603000000000000" pitchFamily="2" charset="0"/>
-              <a:cs typeface="CMU Serif Roman" panose="02000603000000000000" pitchFamily="2" charset="0"/>
-            </a:endParaRPr>
-          </a:p>
-        </p:txBody>
-      </p:sp>
-      <p:sp>
-        <p:nvSpPr>
-          <p:cNvPr id="12" name="CasellaDiTesto 11">
-            <a:extLst>
-              <a:ext uri="{FF2B5EF4-FFF2-40B4-BE49-F238E27FC236}">
-                <a16:creationId xmlns:a16="http://schemas.microsoft.com/office/drawing/2014/main" id="{928F3205-50A0-EDB3-F989-467F34DCB4A2}"/>
-              </a:ext>
-            </a:extLst>
-          </p:cNvPr>
-          <p:cNvSpPr txBox="1"/>
-          <p:nvPr/>
-        </p:nvSpPr>
-        <p:spPr>
-          <a:xfrm>
-            <a:off x="2389326" y="3549008"/>
-            <a:ext cx="729687" cy="276999"/>
-          </a:xfrm>
-          <a:prstGeom prst="rect">
-            <a:avLst/>
-          </a:prstGeom>
-          <a:noFill/>
-        </p:spPr>
-        <p:txBody>
-          <a:bodyPr wrap="none" rtlCol="0">
-            <a:spAutoFit/>
-          </a:bodyPr>
-          <a:lstStyle/>
-          <a:p>
-            <a:pPr algn="ctr"/>
-            <a:r>
-              <a:rPr lang="en-GB" sz="1200" noProof="1">
-                <a:latin typeface="CMU Serif Roman" panose="02000603000000000000" pitchFamily="2" charset="0"/>
-                <a:ea typeface="CMU Serif Roman" panose="02000603000000000000" pitchFamily="2" charset="0"/>
-                <a:cs typeface="CMU Serif Roman" panose="02000603000000000000" pitchFamily="2" charset="0"/>
-              </a:rPr>
-              <a:t>AFTER</a:t>
-            </a:r>
-            <a:endParaRPr lang="en-GB" sz="1200" dirty="0">
-              <a:latin typeface="CMU Serif Roman" panose="02000603000000000000" pitchFamily="2" charset="0"/>
-              <a:ea typeface="CMU Serif Roman" panose="02000603000000000000" pitchFamily="2" charset="0"/>
-              <a:cs typeface="CMU Serif Roman" panose="02000603000000000000" pitchFamily="2" charset="0"/>
-            </a:endParaRPr>
-          </a:p>
-        </p:txBody>
-      </p:sp>
-      <p:sp>
-        <p:nvSpPr>
-          <p:cNvPr id="13" name="Rettangolo 12">
-            <a:extLst>
-              <a:ext uri="{FF2B5EF4-FFF2-40B4-BE49-F238E27FC236}">
-                <a16:creationId xmlns:a16="http://schemas.microsoft.com/office/drawing/2014/main" id="{27C4A987-B36B-E39C-DE2A-D8976C54584A}"/>
-              </a:ext>
-            </a:extLst>
-          </p:cNvPr>
-          <p:cNvSpPr/>
-          <p:nvPr/>
-        </p:nvSpPr>
-        <p:spPr>
-          <a:xfrm>
-            <a:off x="4679368" y="5623899"/>
-            <a:ext cx="289932" cy="412595"/>
-          </a:xfrm>
-          <a:prstGeom prst="rect">
-            <a:avLst/>
-          </a:prstGeom>
-          <a:pattFill prst="pct40">
-            <a:fgClr>
-              <a:srgbClr val="FF0000"/>
-            </a:fgClr>
-            <a:bgClr>
-              <a:schemeClr val="bg1"/>
-            </a:bgClr>
-          </a:pattFill>
-          <a:ln>
-            <a:solidFill>
-              <a:srgbClr val="FF0000"/>
-            </a:solidFill>
-          </a:ln>
-        </p:spPr>
-        <p:style>
-          <a:lnRef idx="2">
-            <a:schemeClr val="accent1">
-              <a:shade val="50000"/>
-            </a:schemeClr>
-          </a:lnRef>
-          <a:fillRef idx="1">
-            <a:schemeClr val="accent1"/>
-          </a:fillRef>
-          <a:effectRef idx="0">
-            <a:schemeClr val="accent1"/>
-          </a:effectRef>
-          <a:fontRef idx="minor">
-            <a:schemeClr val="lt1"/>
-          </a:fontRef>
-        </p:style>
-        <p:txBody>
-          <a:bodyPr rtlCol="0" anchor="ctr"/>
-          <a:lstStyle/>
-          <a:p>
-            <a:pPr algn="ctr"/>
-            <a:endParaRPr lang="en-GB" sz="1200" dirty="0">
-              <a:latin typeface="CMU Serif Roman" panose="02000603000000000000" pitchFamily="2" charset="0"/>
-              <a:ea typeface="CMU Serif Roman" panose="02000603000000000000" pitchFamily="2" charset="0"/>
-              <a:cs typeface="CMU Serif Roman" panose="02000603000000000000" pitchFamily="2" charset="0"/>
-            </a:endParaRPr>
-          </a:p>
-        </p:txBody>
-      </p:sp>
-      <p:sp>
-        <p:nvSpPr>
-          <p:cNvPr id="14" name="Rettangolo 13">
-            <a:extLst>
-              <a:ext uri="{FF2B5EF4-FFF2-40B4-BE49-F238E27FC236}">
-                <a16:creationId xmlns:a16="http://schemas.microsoft.com/office/drawing/2014/main" id="{51A1277A-4F8C-679F-196E-C79CD8D7F40C}"/>
-              </a:ext>
-            </a:extLst>
-          </p:cNvPr>
-          <p:cNvSpPr/>
-          <p:nvPr/>
-        </p:nvSpPr>
-        <p:spPr>
-          <a:xfrm>
-            <a:off x="5189120" y="5623899"/>
-            <a:ext cx="289932" cy="412595"/>
-          </a:xfrm>
-          <a:prstGeom prst="rect">
-            <a:avLst/>
-          </a:prstGeom>
-          <a:pattFill prst="pct40">
-            <a:fgClr>
-              <a:srgbClr val="FF0000"/>
-            </a:fgClr>
-            <a:bgClr>
-              <a:schemeClr val="bg1"/>
-            </a:bgClr>
-          </a:pattFill>
-          <a:ln>
-            <a:solidFill>
-              <a:srgbClr val="FF0000"/>
-            </a:solidFill>
-          </a:ln>
-        </p:spPr>
-        <p:style>
-          <a:lnRef idx="2">
-            <a:schemeClr val="accent1">
-              <a:shade val="50000"/>
-            </a:schemeClr>
-          </a:lnRef>
-          <a:fillRef idx="1">
-            <a:schemeClr val="accent1"/>
-          </a:fillRef>
-          <a:effectRef idx="0">
-            <a:schemeClr val="accent1"/>
-          </a:effectRef>
-          <a:fontRef idx="minor">
-            <a:schemeClr val="lt1"/>
-          </a:fontRef>
-        </p:style>
-        <p:txBody>
-          <a:bodyPr rtlCol="0" anchor="ctr"/>
-          <a:lstStyle/>
-          <a:p>
-            <a:pPr algn="ctr"/>
-            <a:endParaRPr lang="en-GB" sz="1200" dirty="0">
-              <a:latin typeface="CMU Serif Roman" panose="02000603000000000000" pitchFamily="2" charset="0"/>
-              <a:ea typeface="CMU Serif Roman" panose="02000603000000000000" pitchFamily="2" charset="0"/>
-              <a:cs typeface="CMU Serif Roman" panose="02000603000000000000" pitchFamily="2" charset="0"/>
-            </a:endParaRPr>
-          </a:p>
-        </p:txBody>
-      </p:sp>
-      <p:sp>
-        <p:nvSpPr>
-          <p:cNvPr id="15" name="CasellaDiTesto 14">
-            <a:extLst>
-              <a:ext uri="{FF2B5EF4-FFF2-40B4-BE49-F238E27FC236}">
-                <a16:creationId xmlns:a16="http://schemas.microsoft.com/office/drawing/2014/main" id="{C3AD82F8-6BE1-77F9-5AB5-D26B6D1D2CB5}"/>
-              </a:ext>
-            </a:extLst>
-          </p:cNvPr>
-          <p:cNvSpPr txBox="1"/>
-          <p:nvPr/>
-        </p:nvSpPr>
-        <p:spPr>
-          <a:xfrm>
-            <a:off x="5635919" y="5783814"/>
-            <a:ext cx="377026" cy="369332"/>
-          </a:xfrm>
-          <a:prstGeom prst="rect">
-            <a:avLst/>
-          </a:prstGeom>
-          <a:noFill/>
-        </p:spPr>
-        <p:txBody>
-          <a:bodyPr wrap="none" rtlCol="0">
-            <a:spAutoFit/>
-          </a:bodyPr>
-          <a:lstStyle/>
-          <a:p>
-            <a:r>
-              <a:rPr lang="en-GB" dirty="0">
-                <a:latin typeface="CMU Serif Roman" panose="02000603000000000000" pitchFamily="2" charset="0"/>
-                <a:ea typeface="CMU Serif Roman" panose="02000603000000000000" pitchFamily="2" charset="0"/>
-                <a:cs typeface="CMU Serif Roman" panose="02000603000000000000" pitchFamily="2" charset="0"/>
-              </a:rPr>
-              <a:t>…</a:t>
-            </a:r>
-          </a:p>
-        </p:txBody>
-      </p:sp>
-      <p:sp>
-        <p:nvSpPr>
-          <p:cNvPr id="16" name="Rettangolo 15">
-            <a:extLst>
-              <a:ext uri="{FF2B5EF4-FFF2-40B4-BE49-F238E27FC236}">
-                <a16:creationId xmlns:a16="http://schemas.microsoft.com/office/drawing/2014/main" id="{CE76E69C-98C4-933A-910B-6050544EE37D}"/>
-              </a:ext>
-            </a:extLst>
-          </p:cNvPr>
-          <p:cNvSpPr/>
-          <p:nvPr/>
-        </p:nvSpPr>
-        <p:spPr>
-          <a:xfrm>
-            <a:off x="6153421" y="5623899"/>
-            <a:ext cx="289932" cy="412595"/>
-          </a:xfrm>
-          <a:prstGeom prst="rect">
-            <a:avLst/>
-          </a:prstGeom>
-          <a:pattFill prst="pct40">
-            <a:fgClr>
-              <a:srgbClr val="FF0000"/>
-            </a:fgClr>
-            <a:bgClr>
-              <a:schemeClr val="bg1"/>
-            </a:bgClr>
-          </a:pattFill>
-          <a:ln>
-            <a:solidFill>
-              <a:srgbClr val="FF0000"/>
-            </a:solidFill>
-          </a:ln>
-        </p:spPr>
-        <p:style>
-          <a:lnRef idx="2">
-            <a:schemeClr val="accent1">
-              <a:shade val="50000"/>
-            </a:schemeClr>
-          </a:lnRef>
-          <a:fillRef idx="1">
-            <a:schemeClr val="accent1"/>
-          </a:fillRef>
-          <a:effectRef idx="0">
-            <a:schemeClr val="accent1"/>
-          </a:effectRef>
-          <a:fontRef idx="minor">
-            <a:schemeClr val="lt1"/>
-          </a:fontRef>
-        </p:style>
-        <p:txBody>
-          <a:bodyPr rtlCol="0" anchor="ctr"/>
-          <a:lstStyle/>
-          <a:p>
-            <a:pPr algn="ctr"/>
-            <a:endParaRPr lang="en-GB" sz="1200" dirty="0">
-              <a:latin typeface="CMU Serif Roman" panose="02000603000000000000" pitchFamily="2" charset="0"/>
-              <a:ea typeface="CMU Serif Roman" panose="02000603000000000000" pitchFamily="2" charset="0"/>
-              <a:cs typeface="CMU Serif Roman" panose="02000603000000000000" pitchFamily="2" charset="0"/>
-            </a:endParaRPr>
-          </a:p>
-        </p:txBody>
-      </p:sp>
-      <p:sp>
-        <p:nvSpPr>
-          <p:cNvPr id="17" name="Rettangolo 16">
-            <a:extLst>
-              <a:ext uri="{FF2B5EF4-FFF2-40B4-BE49-F238E27FC236}">
-                <a16:creationId xmlns:a16="http://schemas.microsoft.com/office/drawing/2014/main" id="{7541B3DA-F3DA-1AAF-5C8A-7D67BA240AEF}"/>
-              </a:ext>
-            </a:extLst>
-          </p:cNvPr>
-          <p:cNvSpPr/>
-          <p:nvPr/>
-        </p:nvSpPr>
-        <p:spPr>
-          <a:xfrm>
-            <a:off x="3264956" y="5619373"/>
-            <a:ext cx="289932" cy="412595"/>
-          </a:xfrm>
-          <a:prstGeom prst="rect">
-            <a:avLst/>
-          </a:prstGeom>
-          <a:pattFill prst="pct40">
-            <a:fgClr>
-              <a:srgbClr val="FF0000"/>
-            </a:fgClr>
-            <a:bgClr>
-              <a:schemeClr val="bg1"/>
-            </a:bgClr>
-          </a:pattFill>
-          <a:ln>
-            <a:solidFill>
-              <a:srgbClr val="FF0000"/>
-            </a:solidFill>
-          </a:ln>
-        </p:spPr>
-        <p:style>
-          <a:lnRef idx="2">
-            <a:schemeClr val="accent1">
-              <a:shade val="50000"/>
-            </a:schemeClr>
-          </a:lnRef>
-          <a:fillRef idx="1">
-            <a:schemeClr val="accent1"/>
-          </a:fillRef>
-          <a:effectRef idx="0">
-            <a:schemeClr val="accent1"/>
-          </a:effectRef>
-          <a:fontRef idx="minor">
-            <a:schemeClr val="lt1"/>
-          </a:fontRef>
-        </p:style>
-        <p:txBody>
-          <a:bodyPr rtlCol="0" anchor="ctr"/>
-          <a:lstStyle/>
-          <a:p>
-            <a:pPr algn="ctr"/>
-            <a:endParaRPr lang="en-GB" sz="1200" dirty="0">
-              <a:latin typeface="CMU Serif Roman" panose="02000603000000000000" pitchFamily="2" charset="0"/>
-              <a:ea typeface="CMU Serif Roman" panose="02000603000000000000" pitchFamily="2" charset="0"/>
-              <a:cs typeface="CMU Serif Roman" panose="02000603000000000000" pitchFamily="2" charset="0"/>
-            </a:endParaRPr>
-          </a:p>
-        </p:txBody>
-      </p:sp>
-      <p:sp>
-        <p:nvSpPr>
-          <p:cNvPr id="18" name="CasellaDiTesto 17">
-            <a:extLst>
-              <a:ext uri="{FF2B5EF4-FFF2-40B4-BE49-F238E27FC236}">
-                <a16:creationId xmlns:a16="http://schemas.microsoft.com/office/drawing/2014/main" id="{2132E438-A487-3B99-476C-86257AAD87F4}"/>
-              </a:ext>
-            </a:extLst>
-          </p:cNvPr>
-          <p:cNvSpPr txBox="1"/>
-          <p:nvPr/>
-        </p:nvSpPr>
-        <p:spPr>
-          <a:xfrm>
-            <a:off x="3677346" y="5783814"/>
-            <a:ext cx="377026" cy="369332"/>
-          </a:xfrm>
-          <a:prstGeom prst="rect">
-            <a:avLst/>
-          </a:prstGeom>
-          <a:noFill/>
-        </p:spPr>
-        <p:txBody>
-          <a:bodyPr wrap="none" rtlCol="0">
-            <a:spAutoFit/>
-          </a:bodyPr>
-          <a:lstStyle/>
-          <a:p>
-            <a:r>
-              <a:rPr lang="en-GB" dirty="0">
-                <a:latin typeface="CMU Serif Roman" panose="02000603000000000000" pitchFamily="2" charset="0"/>
-                <a:ea typeface="CMU Serif Roman" panose="02000603000000000000" pitchFamily="2" charset="0"/>
-                <a:cs typeface="CMU Serif Roman" panose="02000603000000000000" pitchFamily="2" charset="0"/>
-              </a:rPr>
-              <a:t>…</a:t>
-            </a:r>
-          </a:p>
-        </p:txBody>
-      </p:sp>
-      <p:sp>
-        <p:nvSpPr>
-          <p:cNvPr id="20" name="Rettangolo 19">
-            <a:extLst>
-              <a:ext uri="{FF2B5EF4-FFF2-40B4-BE49-F238E27FC236}">
-                <a16:creationId xmlns:a16="http://schemas.microsoft.com/office/drawing/2014/main" id="{7FFBC33B-D036-AA79-1797-EE84D1FDA8C1}"/>
-              </a:ext>
-            </a:extLst>
-          </p:cNvPr>
-          <p:cNvSpPr/>
-          <p:nvPr/>
-        </p:nvSpPr>
-        <p:spPr>
-          <a:xfrm>
-            <a:off x="4176896" y="5623899"/>
-            <a:ext cx="289932" cy="412595"/>
-          </a:xfrm>
-          <a:prstGeom prst="rect">
-            <a:avLst/>
-          </a:prstGeom>
-          <a:pattFill prst="pct40">
-            <a:fgClr>
-              <a:srgbClr val="FF0000"/>
-            </a:fgClr>
-            <a:bgClr>
-              <a:schemeClr val="bg1"/>
-            </a:bgClr>
-          </a:pattFill>
-          <a:ln>
-            <a:solidFill>
-              <a:srgbClr val="FF0000"/>
-            </a:solidFill>
-          </a:ln>
-        </p:spPr>
-        <p:style>
-          <a:lnRef idx="2">
-            <a:schemeClr val="accent1">
-              <a:shade val="50000"/>
-            </a:schemeClr>
-          </a:lnRef>
-          <a:fillRef idx="1">
-            <a:schemeClr val="accent1"/>
-          </a:fillRef>
-          <a:effectRef idx="0">
-            <a:schemeClr val="accent1"/>
-          </a:effectRef>
-          <a:fontRef idx="minor">
-            <a:schemeClr val="lt1"/>
-          </a:fontRef>
-        </p:style>
-        <p:txBody>
-          <a:bodyPr rtlCol="0" anchor="ctr"/>
-          <a:lstStyle/>
-          <a:p>
-            <a:pPr algn="ctr"/>
-            <a:endParaRPr lang="en-GB" sz="1200" dirty="0">
-              <a:latin typeface="CMU Serif Roman" panose="02000603000000000000" pitchFamily="2" charset="0"/>
-              <a:ea typeface="CMU Serif Roman" panose="02000603000000000000" pitchFamily="2" charset="0"/>
-              <a:cs typeface="CMU Serif Roman" panose="02000603000000000000" pitchFamily="2" charset="0"/>
-            </a:endParaRPr>
-          </a:p>
-        </p:txBody>
-      </p:sp>
-      <p:sp>
-        <p:nvSpPr>
-          <p:cNvPr id="21" name="Rettangolo 20">
-            <a:extLst>
-              <a:ext uri="{FF2B5EF4-FFF2-40B4-BE49-F238E27FC236}">
-                <a16:creationId xmlns:a16="http://schemas.microsoft.com/office/drawing/2014/main" id="{6D9B299F-7D51-7097-3DA7-6D3050C83CFD}"/>
-              </a:ext>
-            </a:extLst>
-          </p:cNvPr>
-          <p:cNvSpPr/>
-          <p:nvPr/>
-        </p:nvSpPr>
-        <p:spPr>
-          <a:xfrm>
-            <a:off x="3264956" y="4538566"/>
-            <a:ext cx="289932" cy="412595"/>
-          </a:xfrm>
-          <a:prstGeom prst="rect">
-            <a:avLst/>
-          </a:prstGeom>
-          <a:pattFill prst="pct40">
-            <a:fgClr>
-              <a:srgbClr val="FF0000"/>
-            </a:fgClr>
-            <a:bgClr>
-              <a:schemeClr val="bg1"/>
-            </a:bgClr>
-          </a:pattFill>
-          <a:ln>
-            <a:solidFill>
-              <a:srgbClr val="FF0000"/>
-            </a:solidFill>
-          </a:ln>
-        </p:spPr>
-        <p:style>
-          <a:lnRef idx="2">
-            <a:schemeClr val="accent1">
-              <a:shade val="50000"/>
-            </a:schemeClr>
-          </a:lnRef>
-          <a:fillRef idx="1">
-            <a:schemeClr val="accent1"/>
-          </a:fillRef>
-          <a:effectRef idx="0">
-            <a:schemeClr val="accent1"/>
-          </a:effectRef>
-          <a:fontRef idx="minor">
-            <a:schemeClr val="lt1"/>
-          </a:fontRef>
-        </p:style>
-        <p:txBody>
-          <a:bodyPr rtlCol="0" anchor="ctr"/>
-          <a:lstStyle/>
-          <a:p>
-            <a:pPr algn="ctr"/>
-            <a:endParaRPr lang="en-GB" sz="1200" dirty="0">
-              <a:latin typeface="CMU Serif Roman" panose="02000603000000000000" pitchFamily="2" charset="0"/>
-              <a:ea typeface="CMU Serif Roman" panose="02000603000000000000" pitchFamily="2" charset="0"/>
-              <a:cs typeface="CMU Serif Roman" panose="02000603000000000000" pitchFamily="2" charset="0"/>
-            </a:endParaRPr>
-          </a:p>
-        </p:txBody>
-      </p:sp>
-      <p:sp>
-        <p:nvSpPr>
-          <p:cNvPr id="22" name="CasellaDiTesto 21">
-            <a:extLst>
-              <a:ext uri="{FF2B5EF4-FFF2-40B4-BE49-F238E27FC236}">
-                <a16:creationId xmlns:a16="http://schemas.microsoft.com/office/drawing/2014/main" id="{422F9008-C556-0E22-4429-E92A8E95BDC3}"/>
-              </a:ext>
-            </a:extLst>
-          </p:cNvPr>
-          <p:cNvSpPr txBox="1"/>
-          <p:nvPr/>
-        </p:nvSpPr>
-        <p:spPr>
-          <a:xfrm>
-            <a:off x="3677346" y="4703007"/>
-            <a:ext cx="377026" cy="369332"/>
-          </a:xfrm>
-          <a:prstGeom prst="rect">
-            <a:avLst/>
-          </a:prstGeom>
-          <a:noFill/>
-        </p:spPr>
-        <p:txBody>
-          <a:bodyPr wrap="none" rtlCol="0">
-            <a:spAutoFit/>
-          </a:bodyPr>
-          <a:lstStyle/>
-          <a:p>
-            <a:r>
-              <a:rPr lang="en-GB" dirty="0">
-                <a:latin typeface="CMU Serif Roman" panose="02000603000000000000" pitchFamily="2" charset="0"/>
-                <a:ea typeface="CMU Serif Roman" panose="02000603000000000000" pitchFamily="2" charset="0"/>
-                <a:cs typeface="CMU Serif Roman" panose="02000603000000000000" pitchFamily="2" charset="0"/>
-              </a:rPr>
-              <a:t>…</a:t>
-            </a:r>
-          </a:p>
-        </p:txBody>
-      </p:sp>
-      <p:sp>
-        <p:nvSpPr>
-          <p:cNvPr id="23" name="Rettangolo 22">
-            <a:extLst>
-              <a:ext uri="{FF2B5EF4-FFF2-40B4-BE49-F238E27FC236}">
-                <a16:creationId xmlns:a16="http://schemas.microsoft.com/office/drawing/2014/main" id="{73F5638C-675F-2E89-21A6-3FBD9EF5E491}"/>
-              </a:ext>
-            </a:extLst>
-          </p:cNvPr>
-          <p:cNvSpPr/>
-          <p:nvPr/>
-        </p:nvSpPr>
-        <p:spPr>
-          <a:xfrm>
-            <a:off x="4176896" y="4543092"/>
-            <a:ext cx="289932" cy="412595"/>
-          </a:xfrm>
-          <a:prstGeom prst="rect">
-            <a:avLst/>
-          </a:prstGeom>
-          <a:pattFill prst="pct40">
-            <a:fgClr>
-              <a:srgbClr val="FF0000"/>
-            </a:fgClr>
-            <a:bgClr>
-              <a:schemeClr val="bg1"/>
-            </a:bgClr>
-          </a:pattFill>
-          <a:ln>
-            <a:solidFill>
-              <a:srgbClr val="FF0000"/>
-            </a:solidFill>
-          </a:ln>
-        </p:spPr>
-        <p:style>
-          <a:lnRef idx="2">
-            <a:schemeClr val="accent1">
-              <a:shade val="50000"/>
-            </a:schemeClr>
-          </a:lnRef>
-          <a:fillRef idx="1">
-            <a:schemeClr val="accent1"/>
-          </a:fillRef>
-          <a:effectRef idx="0">
-            <a:schemeClr val="accent1"/>
-          </a:effectRef>
-          <a:fontRef idx="minor">
-            <a:schemeClr val="lt1"/>
-          </a:fontRef>
-        </p:style>
-        <p:txBody>
-          <a:bodyPr rtlCol="0" anchor="ctr"/>
-          <a:lstStyle/>
-          <a:p>
-            <a:pPr algn="ctr"/>
-            <a:endParaRPr lang="en-GB" sz="1200" dirty="0">
-              <a:latin typeface="CMU Serif Roman" panose="02000603000000000000" pitchFamily="2" charset="0"/>
-              <a:ea typeface="CMU Serif Roman" panose="02000603000000000000" pitchFamily="2" charset="0"/>
-              <a:cs typeface="CMU Serif Roman" panose="02000603000000000000" pitchFamily="2" charset="0"/>
-            </a:endParaRPr>
-          </a:p>
-        </p:txBody>
-      </p:sp>
-      <p:sp>
-        <p:nvSpPr>
-          <p:cNvPr id="24" name="Rettangolo 23">
-            <a:extLst>
-              <a:ext uri="{FF2B5EF4-FFF2-40B4-BE49-F238E27FC236}">
-                <a16:creationId xmlns:a16="http://schemas.microsoft.com/office/drawing/2014/main" id="{4328BBC2-93DC-427B-D661-1122C7CE437A}"/>
-              </a:ext>
-            </a:extLst>
-          </p:cNvPr>
-          <p:cNvSpPr/>
-          <p:nvPr/>
-        </p:nvSpPr>
-        <p:spPr>
-          <a:xfrm>
-            <a:off x="4679368" y="4543092"/>
-            <a:ext cx="289932" cy="412595"/>
-          </a:xfrm>
-          <a:prstGeom prst="rect">
-            <a:avLst/>
-          </a:prstGeom>
-          <a:pattFill prst="pct40">
-            <a:fgClr>
-              <a:srgbClr val="00B050"/>
-            </a:fgClr>
-            <a:bgClr>
-              <a:schemeClr val="bg1"/>
-            </a:bgClr>
-          </a:pattFill>
-          <a:ln>
-            <a:solidFill>
-              <a:srgbClr val="00B050"/>
-            </a:solidFill>
-          </a:ln>
-        </p:spPr>
-        <p:style>
-          <a:lnRef idx="2">
-            <a:schemeClr val="accent1">
-              <a:shade val="50000"/>
-            </a:schemeClr>
-          </a:lnRef>
-          <a:fillRef idx="1">
-            <a:schemeClr val="accent1"/>
-          </a:fillRef>
-          <a:effectRef idx="0">
-            <a:schemeClr val="accent1"/>
-          </a:effectRef>
-          <a:fontRef idx="minor">
-            <a:schemeClr val="lt1"/>
-          </a:fontRef>
-        </p:style>
-        <p:txBody>
-          <a:bodyPr rtlCol="0" anchor="ctr"/>
-          <a:lstStyle/>
-          <a:p>
-            <a:pPr algn="ctr"/>
-            <a:endParaRPr lang="en-GB" sz="1200" dirty="0">
-              <a:latin typeface="CMU Serif Roman" panose="02000603000000000000" pitchFamily="2" charset="0"/>
-              <a:ea typeface="CMU Serif Roman" panose="02000603000000000000" pitchFamily="2" charset="0"/>
-              <a:cs typeface="CMU Serif Roman" panose="02000603000000000000" pitchFamily="2" charset="0"/>
-            </a:endParaRPr>
-          </a:p>
-        </p:txBody>
-      </p:sp>
-      <p:sp>
-        <p:nvSpPr>
-          <p:cNvPr id="25" name="Rettangolo 24">
-            <a:extLst>
-              <a:ext uri="{FF2B5EF4-FFF2-40B4-BE49-F238E27FC236}">
-                <a16:creationId xmlns:a16="http://schemas.microsoft.com/office/drawing/2014/main" id="{48BA98DC-D260-48D4-ACA5-C104C6F0F791}"/>
-              </a:ext>
-            </a:extLst>
-          </p:cNvPr>
-          <p:cNvSpPr/>
-          <p:nvPr/>
-        </p:nvSpPr>
-        <p:spPr>
-          <a:xfrm>
-            <a:off x="5189120" y="4543092"/>
-            <a:ext cx="289932" cy="412595"/>
-          </a:xfrm>
-          <a:prstGeom prst="rect">
-            <a:avLst/>
-          </a:prstGeom>
-          <a:pattFill prst="pct40">
-            <a:fgClr>
-              <a:srgbClr val="00B050"/>
-            </a:fgClr>
-            <a:bgClr>
-              <a:schemeClr val="bg1"/>
-            </a:bgClr>
-          </a:pattFill>
-          <a:ln>
-            <a:solidFill>
-              <a:srgbClr val="00B050"/>
-            </a:solidFill>
-          </a:ln>
-        </p:spPr>
-        <p:style>
-          <a:lnRef idx="2">
-            <a:schemeClr val="accent1">
-              <a:shade val="50000"/>
-            </a:schemeClr>
-          </a:lnRef>
-          <a:fillRef idx="1">
-            <a:schemeClr val="accent1"/>
-          </a:fillRef>
-          <a:effectRef idx="0">
-            <a:schemeClr val="accent1"/>
-          </a:effectRef>
-          <a:fontRef idx="minor">
-            <a:schemeClr val="lt1"/>
-          </a:fontRef>
-        </p:style>
-        <p:txBody>
-          <a:bodyPr rtlCol="0" anchor="ctr"/>
-          <a:lstStyle/>
-          <a:p>
-            <a:pPr algn="ctr"/>
-            <a:endParaRPr lang="en-GB" sz="1200" dirty="0">
-              <a:latin typeface="CMU Serif Roman" panose="02000603000000000000" pitchFamily="2" charset="0"/>
-              <a:ea typeface="CMU Serif Roman" panose="02000603000000000000" pitchFamily="2" charset="0"/>
-              <a:cs typeface="CMU Serif Roman" panose="02000603000000000000" pitchFamily="2" charset="0"/>
-            </a:endParaRPr>
-          </a:p>
-        </p:txBody>
-      </p:sp>
-      <p:sp>
-        <p:nvSpPr>
-          <p:cNvPr id="27" name="CasellaDiTesto 26">
-            <a:extLst>
-              <a:ext uri="{FF2B5EF4-FFF2-40B4-BE49-F238E27FC236}">
-                <a16:creationId xmlns:a16="http://schemas.microsoft.com/office/drawing/2014/main" id="{1B5F5CCB-3F47-AEF7-E5F9-C098C2D3268B}"/>
-              </a:ext>
-            </a:extLst>
-          </p:cNvPr>
-          <p:cNvSpPr txBox="1"/>
-          <p:nvPr/>
-        </p:nvSpPr>
-        <p:spPr>
-          <a:xfrm>
-            <a:off x="5635919" y="4703007"/>
-            <a:ext cx="377026" cy="369332"/>
-          </a:xfrm>
-          <a:prstGeom prst="rect">
-            <a:avLst/>
-          </a:prstGeom>
-          <a:noFill/>
-        </p:spPr>
-        <p:txBody>
-          <a:bodyPr wrap="none" rtlCol="0">
-            <a:spAutoFit/>
-          </a:bodyPr>
-          <a:lstStyle/>
-          <a:p>
-            <a:r>
-              <a:rPr lang="en-GB" dirty="0">
-                <a:latin typeface="CMU Serif Roman" panose="02000603000000000000" pitchFamily="2" charset="0"/>
-                <a:ea typeface="CMU Serif Roman" panose="02000603000000000000" pitchFamily="2" charset="0"/>
-                <a:cs typeface="CMU Serif Roman" panose="02000603000000000000" pitchFamily="2" charset="0"/>
-              </a:rPr>
-              <a:t>…</a:t>
-            </a:r>
-          </a:p>
-        </p:txBody>
-      </p:sp>
-      <p:sp>
-        <p:nvSpPr>
-          <p:cNvPr id="28" name="Rettangolo 27">
-            <a:extLst>
-              <a:ext uri="{FF2B5EF4-FFF2-40B4-BE49-F238E27FC236}">
-                <a16:creationId xmlns:a16="http://schemas.microsoft.com/office/drawing/2014/main" id="{322334DF-A97A-0E8F-2225-F10FCDDCB06A}"/>
-              </a:ext>
-            </a:extLst>
-          </p:cNvPr>
-          <p:cNvSpPr/>
-          <p:nvPr/>
-        </p:nvSpPr>
-        <p:spPr>
-          <a:xfrm>
-            <a:off x="6153421" y="4543092"/>
-            <a:ext cx="289932" cy="412595"/>
-          </a:xfrm>
-          <a:prstGeom prst="rect">
-            <a:avLst/>
-          </a:prstGeom>
-          <a:pattFill prst="pct40">
-            <a:fgClr>
-              <a:srgbClr val="00B050"/>
-            </a:fgClr>
-            <a:bgClr>
-              <a:schemeClr val="bg1"/>
-            </a:bgClr>
-          </a:pattFill>
-          <a:ln>
-            <a:solidFill>
-              <a:srgbClr val="00B050"/>
-            </a:solidFill>
-          </a:ln>
-        </p:spPr>
-        <p:style>
-          <a:lnRef idx="2">
-            <a:schemeClr val="accent1">
-              <a:shade val="50000"/>
-            </a:schemeClr>
-          </a:lnRef>
-          <a:fillRef idx="1">
-            <a:schemeClr val="accent1"/>
-          </a:fillRef>
-          <a:effectRef idx="0">
-            <a:schemeClr val="accent1"/>
-          </a:effectRef>
-          <a:fontRef idx="minor">
-            <a:schemeClr val="lt1"/>
-          </a:fontRef>
-        </p:style>
-        <p:txBody>
-          <a:bodyPr rtlCol="0" anchor="ctr"/>
-          <a:lstStyle/>
-          <a:p>
-            <a:pPr algn="ctr"/>
-            <a:endParaRPr lang="en-GB" sz="1200" dirty="0">
-              <a:latin typeface="CMU Serif Roman" panose="02000603000000000000" pitchFamily="2" charset="0"/>
-              <a:ea typeface="CMU Serif Roman" panose="02000603000000000000" pitchFamily="2" charset="0"/>
-              <a:cs typeface="CMU Serif Roman" panose="02000603000000000000" pitchFamily="2" charset="0"/>
-            </a:endParaRPr>
-          </a:p>
-        </p:txBody>
-      </p:sp>
-      <p:sp>
-        <p:nvSpPr>
           <p:cNvPr id="29" name="Rettangolo 28">
             <a:extLst>
               <a:ext uri="{FF2B5EF4-FFF2-40B4-BE49-F238E27FC236}">
@@ -11612,15 +11611,7 @@
                 <a:ea typeface="CMU Concrete Roman" panose="02000603000000000000" pitchFamily="2" charset="0"/>
                 <a:cs typeface="CMU Concrete Roman" panose="02000603000000000000" pitchFamily="2" charset="0"/>
               </a:rPr>
-              <a:t>+ k-</a:t>
-            </a:r>
-            <a:r>
-              <a:rPr lang="en-GB" sz="1200" dirty="0">
-                <a:latin typeface="CMU Concrete Roman" panose="02000603000000000000" pitchFamily="2" charset="0"/>
-                <a:ea typeface="CMU Concrete Roman" panose="02000603000000000000" pitchFamily="2" charset="0"/>
-                <a:cs typeface="CMU Concrete Roman" panose="02000603000000000000" pitchFamily="2" charset="0"/>
-              </a:rPr>
-              <a:t>m </a:t>
+              <a:t>+ k-m </a:t>
             </a:r>
             <a:r>
               <a:rPr lang="en-GB" sz="1200" dirty="0">

</xml_diff>